<commit_message>
finished slides for module02, still need ps02
</commit_message>
<xml_diff>
--- a/Slides/Lesson 2.4 Testing.pptx
+++ b/Slides/Lesson 2.4 Testing.pptx
@@ -11,17 +11,17 @@
     <p:sldId id="276" r:id="rId2"/>
     <p:sldId id="325" r:id="rId3"/>
     <p:sldId id="326" r:id="rId4"/>
-    <p:sldId id="339" r:id="rId5"/>
+    <p:sldId id="345" r:id="rId5"/>
     <p:sldId id="340" r:id="rId6"/>
     <p:sldId id="341" r:id="rId7"/>
-    <p:sldId id="342" r:id="rId8"/>
-    <p:sldId id="344" r:id="rId9"/>
-    <p:sldId id="343" r:id="rId10"/>
-    <p:sldId id="281" r:id="rId11"/>
-    <p:sldId id="282" r:id="rId12"/>
-    <p:sldId id="283" r:id="rId13"/>
-    <p:sldId id="284" r:id="rId14"/>
-    <p:sldId id="285" r:id="rId15"/>
+    <p:sldId id="285" r:id="rId8"/>
+    <p:sldId id="346" r:id="rId9"/>
+    <p:sldId id="348" r:id="rId10"/>
+    <p:sldId id="349" r:id="rId11"/>
+    <p:sldId id="350" r:id="rId12"/>
+    <p:sldId id="343" r:id="rId13"/>
+    <p:sldId id="281" r:id="rId14"/>
+    <p:sldId id="282" r:id="rId15"/>
     <p:sldId id="286" r:id="rId16"/>
     <p:sldId id="327" r:id="rId17"/>
     <p:sldId id="287" r:id="rId18"/>
@@ -38,9 +38,9 @@
     <p:sldId id="331" r:id="rId29"/>
     <p:sldId id="332" r:id="rId30"/>
     <p:sldId id="333" r:id="rId31"/>
-    <p:sldId id="335" r:id="rId32"/>
-    <p:sldId id="295" r:id="rId33"/>
-    <p:sldId id="296" r:id="rId34"/>
+    <p:sldId id="295" r:id="rId32"/>
+    <p:sldId id="296" r:id="rId33"/>
+    <p:sldId id="351" r:id="rId34"/>
     <p:sldId id="338" r:id="rId35"/>
   </p:sldIdLst>
   <p:sldSz cx="9144000" cy="6858000" type="screen4x3"/>
@@ -151,17 +151,17 @@
             <p14:sldId id="276"/>
             <p14:sldId id="325"/>
             <p14:sldId id="326"/>
-            <p14:sldId id="339"/>
+            <p14:sldId id="345"/>
             <p14:sldId id="340"/>
             <p14:sldId id="341"/>
-            <p14:sldId id="342"/>
-            <p14:sldId id="344"/>
+            <p14:sldId id="285"/>
+            <p14:sldId id="346"/>
+            <p14:sldId id="348"/>
+            <p14:sldId id="349"/>
+            <p14:sldId id="350"/>
             <p14:sldId id="343"/>
             <p14:sldId id="281"/>
             <p14:sldId id="282"/>
-            <p14:sldId id="283"/>
-            <p14:sldId id="284"/>
-            <p14:sldId id="285"/>
             <p14:sldId id="286"/>
             <p14:sldId id="327"/>
             <p14:sldId id="287"/>
@@ -178,9 +178,9 @@
             <p14:sldId id="331"/>
             <p14:sldId id="332"/>
             <p14:sldId id="333"/>
-            <p14:sldId id="335"/>
             <p14:sldId id="295"/>
             <p14:sldId id="296"/>
+            <p14:sldId id="351"/>
             <p14:sldId id="338"/>
           </p14:sldIdLst>
         </p14:section>
@@ -286,7 +286,7 @@
           <a:p>
             <a:fld id="{0FAC78B3-EDCE-4187-A1AE-28620314FA32}" type="datetimeFigureOut">
               <a:rPr lang="en-US" smtClean="0"/>
-              <a:t>7/24/2016</a:t>
+              <a:t>7/28/2016</a:t>
             </a:fld>
             <a:endParaRPr lang="en-US"/>
           </a:p>
@@ -619,7 +619,7 @@
             <a:fld id="{2579440B-E791-2640-8935-69975A005A8A}" type="slidenum">
               <a:rPr lang="en-US" smtClean="0"/>
               <a:pPr/>
-              <a:t>14</a:t>
+              <a:t>7</a:t>
             </a:fld>
             <a:endParaRPr lang="en-US"/>
           </a:p>
@@ -852,26 +852,6 @@
           <a:bodyPr/>
           <a:lstStyle/>
           <a:p>
-            <a:r>
-              <a:rPr lang="en-US" dirty="0"/>
-              <a:t>Now we're ready to run our program.  What are the things that could go wrong?  Well, first your program could fail to load.  This could be the result of unbalanced parentheses.  Luckily, the Racket interaction window will usually highlight the unmatched parenthesis.  It's up to you, of course, to figure out where the matching </a:t>
-            </a:r>
-            <a:r>
-              <a:rPr lang="en-US" dirty="0" err="1"/>
-              <a:t>paren</a:t>
-            </a:r>
-            <a:r>
-              <a:rPr lang="en-US" dirty="0"/>
-              <a:t> should be inserted.</a:t>
-            </a:r>
-          </a:p>
-          <a:p>
-            <a:r>
-              <a:rPr lang="en-US" dirty="0"/>
-              <a:t>Another possibility is that you have a missing or undefined function.  Maybe you just forgot to write the function definition, or you misspelled the function name, as we did in the last demonstration.  Or maybe you forgot to require the appropriate library. Or maybe you misspelled the library name—the error message Racket gives you in this case is especially scary. But don't be frightened, it just means it couldn't find the library you told it to look for.  All these are pretty easy to fix.</a:t>
-            </a:r>
-          </a:p>
-          <a:p>
             <a:endParaRPr lang="en-US" dirty="0"/>
           </a:p>
         </p:txBody>
@@ -1064,7 +1044,7 @@
             <a:fld id="{D1C3DFC0-C863-7E4E-9CF4-900F1AC70FCB}" type="slidenum">
               <a:rPr lang="en-US" smtClean="0"/>
               <a:pPr/>
-              <a:t>32</a:t>
+              <a:t>31</a:t>
             </a:fld>
             <a:endParaRPr lang="en-US"/>
           </a:p>
@@ -1149,7 +1129,7 @@
             <a:fld id="{D1C3DFC0-C863-7E4E-9CF4-900F1AC70FCB}" type="slidenum">
               <a:rPr lang="en-US" smtClean="0"/>
               <a:pPr/>
-              <a:t>33</a:t>
+              <a:t>32</a:t>
             </a:fld>
             <a:endParaRPr lang="en-US"/>
           </a:p>
@@ -1354,7 +1334,7 @@
                 </a:solidFill>
               </a:rPr>
               <a:pPr/>
-              <a:t>7/24/2016</a:t>
+              <a:t>7/28/2016</a:t>
             </a:fld>
             <a:endParaRPr lang="en-US">
               <a:solidFill>
@@ -1481,7 +1461,7 @@
                 </a:solidFill>
               </a:rPr>
               <a:pPr/>
-              <a:t>7/24/2016</a:t>
+              <a:t>7/28/2016</a:t>
             </a:fld>
             <a:endParaRPr lang="en-US">
               <a:solidFill>
@@ -1788,7 +1768,7 @@
                 </a:solidFill>
               </a:rPr>
               <a:pPr/>
-              <a:t>7/24/2016</a:t>
+              <a:t>7/28/2016</a:t>
             </a:fld>
             <a:endParaRPr lang="en-US">
               <a:solidFill>
@@ -2072,7 +2052,7 @@
                 </a:solidFill>
               </a:rPr>
               <a:pPr/>
-              <a:t>7/24/2016</a:t>
+              <a:t>7/28/2016</a:t>
             </a:fld>
             <a:endParaRPr lang="en-US">
               <a:solidFill>
@@ -2272,7 +2252,7 @@
                 </a:solidFill>
               </a:rPr>
               <a:pPr/>
-              <a:t>7/24/2016</a:t>
+              <a:t>7/28/2016</a:t>
             </a:fld>
             <a:endParaRPr lang="en-US">
               <a:solidFill>
@@ -2482,7 +2462,7 @@
                 </a:solidFill>
               </a:rPr>
               <a:pPr/>
-              <a:t>7/24/2016</a:t>
+              <a:t>7/28/2016</a:t>
             </a:fld>
             <a:endParaRPr lang="en-US">
               <a:solidFill>
@@ -2688,7 +2668,7 @@
                 </a:solidFill>
               </a:rPr>
               <a:pPr/>
-              <a:t>7/24/2016</a:t>
+              <a:t>7/28/2016</a:t>
             </a:fld>
             <a:endParaRPr lang="en-US">
               <a:solidFill>
@@ -2893,7 +2873,7 @@
                 </a:solidFill>
               </a:rPr>
               <a:pPr/>
-              <a:t>7/24/2016</a:t>
+              <a:t>7/28/2016</a:t>
             </a:fld>
             <a:endParaRPr lang="en-US">
               <a:solidFill>
@@ -3184,7 +3164,7 @@
                 </a:solidFill>
               </a:rPr>
               <a:pPr/>
-              <a:t>7/24/2016</a:t>
+              <a:t>7/28/2016</a:t>
             </a:fld>
             <a:endParaRPr lang="en-US">
               <a:solidFill>
@@ -3392,7 +3372,7 @@
                 </a:solidFill>
               </a:rPr>
               <a:pPr/>
-              <a:t>7/24/2016</a:t>
+              <a:t>7/28/2016</a:t>
             </a:fld>
             <a:endParaRPr lang="en-US">
               <a:solidFill>
@@ -3718,7 +3698,7 @@
                 </a:solidFill>
               </a:rPr>
               <a:pPr/>
-              <a:t>7/24/2016</a:t>
+              <a:t>7/28/2016</a:t>
             </a:fld>
             <a:endParaRPr lang="en-US">
               <a:solidFill>
@@ -4035,7 +4015,7 @@
                 </a:solidFill>
               </a:rPr>
               <a:pPr/>
-              <a:t>7/24/2016</a:t>
+              <a:t>7/28/2016</a:t>
             </a:fld>
             <a:endParaRPr lang="en-US">
               <a:solidFill>
@@ -4486,7 +4466,7 @@
                 </a:solidFill>
               </a:rPr>
               <a:pPr/>
-              <a:t>7/24/2016</a:t>
+              <a:t>7/28/2016</a:t>
             </a:fld>
             <a:endParaRPr lang="en-US">
               <a:solidFill>
@@ -4635,7 +4615,7 @@
                 </a:solidFill>
               </a:rPr>
               <a:pPr/>
-              <a:t>7/24/2016</a:t>
+              <a:t>7/28/2016</a:t>
             </a:fld>
             <a:endParaRPr lang="en-US">
               <a:solidFill>
@@ -4890,7 +4870,7 @@
                 </a:solidFill>
               </a:rPr>
               <a:pPr/>
-              <a:t>7/24/2016</a:t>
+              <a:t>7/28/2016</a:t>
             </a:fld>
             <a:endParaRPr lang="en-US">
               <a:solidFill>
@@ -5311,7 +5291,7 @@
           <a:p>
             <a:r>
               <a:rPr lang="en-US" dirty="0"/>
-              <a:t>Testing and Debugging</a:t>
+              <a:t>Testing</a:t>
             </a:r>
           </a:p>
         </p:txBody>
@@ -5447,7 +5427,7 @@
             <a:p>
               <a:r>
                 <a:rPr lang="en-US" sz="1000" dirty="0"/>
-                <a:t>© Mitchell Wand, 2012-2014</a:t>
+                <a:t>© Mitchell Wand, 2012-2016</a:t>
               </a:r>
             </a:p>
             <a:p>
@@ -5540,7 +5520,7 @@
           <a:p>
             <a:r>
               <a:rPr lang="en-US" dirty="0"/>
-              <a:t>Equivalence Partitioning</a:t>
+              <a:t>Property Testing</a:t>
             </a:r>
           </a:p>
         </p:txBody>
@@ -5558,53 +5538,51 @@
         <p:spPr/>
         <p:txBody>
           <a:bodyPr>
-            <a:normAutofit fontScale="92500" lnSpcReduction="20000"/>
+            <a:normAutofit lnSpcReduction="10000"/>
           </a:bodyPr>
           <a:lstStyle/>
           <a:p>
             <a:r>
               <a:rPr lang="en-US" dirty="0"/>
-              <a:t>Possible arguments to your function typically fall into classes for which the program yields similar results.</a:t>
-            </a:r>
-          </a:p>
-          <a:p>
-            <a:r>
-              <a:rPr lang="en-US" dirty="0"/>
-              <a:t>Example: f2c had only 1 partition.</a:t>
-            </a:r>
-          </a:p>
-          <a:p>
-            <a:r>
-              <a:rPr lang="en-US" dirty="0"/>
-              <a:t>Example: ball-after-mouse depends on</a:t>
-            </a:r>
-          </a:p>
-          <a:p>
-            <a:pPr lvl="1"/>
-            <a:r>
-              <a:rPr lang="en-US" dirty="0"/>
-              <a:t>Which mouse event we’re dealing with</a:t>
-            </a:r>
-          </a:p>
-          <a:p>
-            <a:pPr lvl="1"/>
-            <a:r>
-              <a:rPr lang="en-US" dirty="0"/>
-              <a:t>Whether the mouse event is inside or outside the ball</a:t>
-            </a:r>
-          </a:p>
-          <a:p>
-            <a:pPr lvl="1"/>
-            <a:r>
-              <a:rPr lang="en-US" dirty="0"/>
-              <a:t>Whether the ball is selected</a:t>
-            </a:r>
-          </a:p>
-          <a:p>
-            <a:r>
-              <a:rPr lang="en-US" dirty="0"/>
-              <a:t>So we need 3 x 2 x 2 = 12 tests to cover all these combinations.</a:t>
-            </a:r>
+              <a:t>Test a </a:t>
+            </a:r>
+            <a:r>
+              <a:rPr lang="en-US" i="1" dirty="0"/>
+              <a:t>property</a:t>
+            </a:r>
+            <a:r>
+              <a:rPr lang="en-US" dirty="0"/>
+              <a:t> of the answer</a:t>
+            </a:r>
+          </a:p>
+          <a:p>
+            <a:r>
+              <a:rPr lang="en-US" dirty="0"/>
+              <a:t>Sometimes all you care about is that the answer has some property</a:t>
+            </a:r>
+          </a:p>
+          <a:p>
+            <a:r>
+              <a:rPr lang="en-US" dirty="0"/>
+              <a:t>There could be more than one acceptable answer.</a:t>
+            </a:r>
+          </a:p>
+          <a:p>
+            <a:r>
+              <a:rPr lang="en-US" dirty="0"/>
+              <a:t>Maybe the answer is something really complicated, so </a:t>
+            </a:r>
+            <a:r>
+              <a:rPr lang="en-US" b="1" dirty="0"/>
+              <a:t>check-equal? </a:t>
+            </a:r>
+            <a:r>
+              <a:rPr lang="en-US" dirty="0"/>
+              <a:t>won’t do the job, and the best we can do is check to see whether the answer is “good enough.”</a:t>
+            </a:r>
+          </a:p>
+          <a:p>
+            <a:endParaRPr lang="en-US" dirty="0"/>
           </a:p>
         </p:txBody>
       </p:sp>
@@ -5623,19 +5601,31 @@
           <a:bodyPr/>
           <a:lstStyle/>
           <a:p>
-            <a:fld id="{B6F15528-21DE-4FAA-801E-634DDDAF4B2B}" type="slidenum">
-              <a:rPr lang="en-US" smtClean="0"/>
+            <a:fld id="{2AF3B5EA-18B6-4040-9F78-6052AF49C681}" type="slidenum">
+              <a:rPr lang="en-US" smtClean="0">
+                <a:solidFill>
+                  <a:prstClr val="black">
+                    <a:tint val="75000"/>
+                  </a:prstClr>
+                </a:solidFill>
+              </a:rPr>
               <a:pPr/>
               <a:t>10</a:t>
             </a:fld>
-            <a:endParaRPr lang="en-US"/>
+            <a:endParaRPr lang="en-US">
+              <a:solidFill>
+                <a:prstClr val="black">
+                  <a:tint val="75000"/>
+                </a:prstClr>
+              </a:solidFill>
+            </a:endParaRPr>
           </a:p>
         </p:txBody>
       </p:sp>
     </p:spTree>
     <p:extLst>
       <p:ext uri="{BB962C8B-B14F-4D97-AF65-F5344CB8AC3E}">
-        <p14:creationId xmlns:p14="http://schemas.microsoft.com/office/powerpoint/2010/main" val="1178833121"/>
+        <p14:creationId xmlns:p14="http://schemas.microsoft.com/office/powerpoint/2010/main" val="1402872492"/>
       </p:ext>
     </p:extLst>
   </p:cSld>
@@ -5679,14 +5669,379 @@
           <a:p>
             <a:r>
               <a:rPr lang="en-US" dirty="0"/>
-              <a:t>Equivalence Partitioning</a:t>
-            </a:r>
-          </a:p>
-        </p:txBody>
-      </p:sp>
-      <p:sp>
-        <p:nvSpPr>
-          <p:cNvPr id="3" name="Slide Number Placeholder 2"/>
+              <a:t>Example of Property Testing</a:t>
+            </a:r>
+          </a:p>
+        </p:txBody>
+      </p:sp>
+      <p:sp>
+        <p:nvSpPr>
+          <p:cNvPr id="5" name="Content Placeholder 4"/>
+          <p:cNvSpPr>
+            <a:spLocks noGrp="1"/>
+          </p:cNvSpPr>
+          <p:nvPr>
+            <p:ph idx="1"/>
+          </p:nvPr>
+        </p:nvSpPr>
+        <p:spPr/>
+        <p:txBody>
+          <a:bodyPr>
+            <a:normAutofit fontScale="47500" lnSpcReduction="20000"/>
+          </a:bodyPr>
+          <a:lstStyle/>
+          <a:p>
+            <a:r>
+              <a:rPr lang="en-US" dirty="0"/>
+              <a:t>;; zero-of-quadratic? : Real^4 -&gt; Boolean</a:t>
+            </a:r>
+          </a:p>
+          <a:p>
+            <a:r>
+              <a:rPr lang="en-US" dirty="0"/>
+              <a:t>;; RETURNS: whether abs(ax^2 + </a:t>
+            </a:r>
+            <a:r>
+              <a:rPr lang="en-US" dirty="0" err="1"/>
+              <a:t>bx</a:t>
+            </a:r>
+            <a:r>
+              <a:rPr lang="en-US" dirty="0"/>
+              <a:t> + c) &lt; .01</a:t>
+            </a:r>
+          </a:p>
+          <a:p>
+            <a:r>
+              <a:rPr lang="en-US" dirty="0"/>
+              <a:t>(define (zero-of-quadratic? a b c x)</a:t>
+            </a:r>
+          </a:p>
+          <a:p>
+            <a:r>
+              <a:rPr lang="en-US" dirty="0"/>
+              <a:t>  (&lt; (magnitude</a:t>
+            </a:r>
+          </a:p>
+          <a:p>
+            <a:r>
+              <a:rPr lang="en-US" dirty="0"/>
+              <a:t>      (+ (* a x x)</a:t>
+            </a:r>
+          </a:p>
+          <a:p>
+            <a:r>
+              <a:rPr lang="en-US" dirty="0"/>
+              <a:t>         (* b x)</a:t>
+            </a:r>
+          </a:p>
+          <a:p>
+            <a:r>
+              <a:rPr lang="en-US" dirty="0"/>
+              <a:t>         c))</a:t>
+            </a:r>
+          </a:p>
+          <a:p>
+            <a:r>
+              <a:rPr lang="en-US" dirty="0"/>
+              <a:t>     .01))</a:t>
+            </a:r>
+          </a:p>
+          <a:p>
+            <a:endParaRPr lang="en-US" dirty="0"/>
+          </a:p>
+          <a:p>
+            <a:r>
+              <a:rPr lang="en-US" dirty="0"/>
+              <a:t>(define (quadratic-solution1 a b c) ...)</a:t>
+            </a:r>
+          </a:p>
+          <a:p>
+            <a:r>
+              <a:rPr lang="en-US" dirty="0"/>
+              <a:t>(define (quadratic-solution2 a b c) ...)</a:t>
+            </a:r>
+          </a:p>
+          <a:p>
+            <a:endParaRPr lang="en-US" dirty="0"/>
+          </a:p>
+          <a:p>
+            <a:r>
+              <a:rPr lang="en-US" dirty="0"/>
+              <a:t>(begin-for-test</a:t>
+            </a:r>
+          </a:p>
+          <a:p>
+            <a:r>
+              <a:rPr lang="en-US" dirty="0"/>
+              <a:t>  (check-true (zero-of-quadratic? 1 0 4 (quadratic-solution1 1 0 4)))</a:t>
+            </a:r>
+          </a:p>
+          <a:p>
+            <a:r>
+              <a:rPr lang="en-US" dirty="0"/>
+              <a:t>  (check-true (zero-of-quadratic? 1 0 4 (quadratic-solution2 1 0 4)))</a:t>
+            </a:r>
+          </a:p>
+          <a:p>
+            <a:r>
+              <a:rPr lang="en-US" dirty="0"/>
+              <a:t>  (check-true (zero-of-quadratic? 1 0 1 (quadratic-solution1 1 0 1)))</a:t>
+            </a:r>
+          </a:p>
+          <a:p>
+            <a:r>
+              <a:rPr lang="en-US" dirty="0"/>
+              <a:t>  (check-true (zero-of-quadratic? 1 0 1 (quadratic-solution2 1 0 1)))</a:t>
+            </a:r>
+          </a:p>
+          <a:p>
+            <a:r>
+              <a:rPr lang="en-US" dirty="0"/>
+              <a:t>  (check-true (zero-of-quadratic? 13 58 6 (quadratic-solution1 13 58 6))))</a:t>
+            </a:r>
+          </a:p>
+          <a:p>
+            <a:endParaRPr lang="en-US" dirty="0"/>
+          </a:p>
+        </p:txBody>
+      </p:sp>
+      <p:sp>
+        <p:nvSpPr>
+          <p:cNvPr id="4" name="Slide Number Placeholder 3"/>
+          <p:cNvSpPr>
+            <a:spLocks noGrp="1"/>
+          </p:cNvSpPr>
+          <p:nvPr>
+            <p:ph type="sldNum" sz="quarter" idx="12"/>
+          </p:nvPr>
+        </p:nvSpPr>
+        <p:spPr/>
+        <p:txBody>
+          <a:bodyPr/>
+          <a:lstStyle/>
+          <a:p>
+            <a:fld id="{2AF3B5EA-18B6-4040-9F78-6052AF49C681}" type="slidenum">
+              <a:rPr lang="en-US" smtClean="0">
+                <a:solidFill>
+                  <a:prstClr val="black">
+                    <a:tint val="75000"/>
+                  </a:prstClr>
+                </a:solidFill>
+              </a:rPr>
+              <a:pPr/>
+              <a:t>11</a:t>
+            </a:fld>
+            <a:endParaRPr lang="en-US">
+              <a:solidFill>
+                <a:prstClr val="black">
+                  <a:tint val="75000"/>
+                </a:prstClr>
+              </a:solidFill>
+            </a:endParaRPr>
+          </a:p>
+        </p:txBody>
+      </p:sp>
+      <p:sp>
+        <p:nvSpPr>
+          <p:cNvPr id="6" name="Rectangle 5"/>
+          <p:cNvSpPr/>
+          <p:nvPr/>
+        </p:nvSpPr>
+        <p:spPr>
+          <a:xfrm>
+            <a:off x="5410200" y="2036787"/>
+            <a:ext cx="3048000" cy="1828800"/>
+          </a:xfrm>
+          <a:prstGeom prst="rect">
+            <a:avLst/>
+          </a:prstGeom>
+          <a:solidFill>
+            <a:schemeClr val="accent3">
+              <a:lumMod val="40000"/>
+              <a:lumOff val="60000"/>
+            </a:schemeClr>
+          </a:solidFill>
+          <a:ln/>
+        </p:spPr>
+        <p:style>
+          <a:lnRef idx="2">
+            <a:schemeClr val="accent1"/>
+          </a:lnRef>
+          <a:fillRef idx="1">
+            <a:schemeClr val="lt1"/>
+          </a:fillRef>
+          <a:effectRef idx="0">
+            <a:schemeClr val="accent1"/>
+          </a:effectRef>
+          <a:fontRef idx="minor">
+            <a:schemeClr val="dk1"/>
+          </a:fontRef>
+        </p:style>
+        <p:txBody>
+          <a:bodyPr rot="0" spcFirstLastPara="0" vertOverflow="overflow" horzOverflow="overflow" vert="horz" wrap="square" lIns="91440" tIns="45720" rIns="91440" bIns="45720" numCol="1" spcCol="0" rtlCol="0" fromWordArt="0" anchor="ctr" anchorCtr="0" forceAA="0" compatLnSpc="1">
+            <a:prstTxWarp prst="textNoShape">
+              <a:avLst/>
+            </a:prstTxWarp>
+            <a:noAutofit/>
+          </a:bodyPr>
+          <a:lstStyle/>
+          <a:p>
+            <a:r>
+              <a:rPr lang="en-US" dirty="0">
+                <a:solidFill>
+                  <a:schemeClr val="tx1"/>
+                </a:solidFill>
+              </a:rPr>
+              <a:t>I didn’t have to find the solution to these examples by hand (especially the last one!)</a:t>
+            </a:r>
+          </a:p>
+          <a:p>
+            <a:r>
+              <a:rPr lang="en-US" dirty="0">
+                <a:solidFill>
+                  <a:schemeClr val="tx1"/>
+                </a:solidFill>
+              </a:rPr>
+              <a:t>I don’t care what the solutions are.  I only care that they solve the given equations.</a:t>
+            </a:r>
+          </a:p>
+        </p:txBody>
+      </p:sp>
+    </p:spTree>
+    <p:extLst>
+      <p:ext uri="{BB962C8B-B14F-4D97-AF65-F5344CB8AC3E}">
+        <p14:creationId xmlns:p14="http://schemas.microsoft.com/office/powerpoint/2010/main" val="3012177988"/>
+      </p:ext>
+    </p:extLst>
+  </p:cSld>
+  <p:clrMapOvr>
+    <a:masterClrMapping/>
+  </p:clrMapOvr>
+</p:sld>
+</file>
+
+<file path=ppt/slides/slide12.xml><?xml version="1.0" encoding="utf-8"?>
+<p:sld xmlns:a="http://schemas.openxmlformats.org/drawingml/2006/main" xmlns:r="http://schemas.openxmlformats.org/officeDocument/2006/relationships" xmlns:p="http://schemas.openxmlformats.org/presentationml/2006/main">
+  <p:cSld>
+    <p:spTree>
+      <p:nvGrpSpPr>
+        <p:cNvPr id="1" name=""/>
+        <p:cNvGrpSpPr/>
+        <p:nvPr/>
+      </p:nvGrpSpPr>
+      <p:grpSpPr>
+        <a:xfrm>
+          <a:off x="0" y="0"/>
+          <a:ext cx="0" cy="0"/>
+          <a:chOff x="0" y="0"/>
+          <a:chExt cx="0" cy="0"/>
+        </a:xfrm>
+      </p:grpSpPr>
+      <p:sp>
+        <p:nvSpPr>
+          <p:cNvPr id="2" name="Title 1"/>
+          <p:cNvSpPr>
+            <a:spLocks noGrp="1"/>
+          </p:cNvSpPr>
+          <p:nvPr>
+            <p:ph type="title"/>
+          </p:nvPr>
+        </p:nvSpPr>
+        <p:spPr/>
+        <p:txBody>
+          <a:bodyPr/>
+          <a:lstStyle/>
+          <a:p>
+            <a:r>
+              <a:rPr lang="en-US" dirty="0"/>
+              <a:t>Test Coverage</a:t>
+            </a:r>
+          </a:p>
+        </p:txBody>
+      </p:sp>
+      <p:sp>
+        <p:nvSpPr>
+          <p:cNvPr id="3" name="Content Placeholder 2"/>
+          <p:cNvSpPr>
+            <a:spLocks noGrp="1"/>
+          </p:cNvSpPr>
+          <p:nvPr>
+            <p:ph idx="1"/>
+          </p:nvPr>
+        </p:nvSpPr>
+        <p:spPr/>
+        <p:txBody>
+          <a:bodyPr>
+            <a:normAutofit lnSpcReduction="10000"/>
+          </a:bodyPr>
+          <a:lstStyle/>
+          <a:p>
+            <a:r>
+              <a:rPr lang="en-US" dirty="0"/>
+              <a:t>How much of the possible behaviors have we tested?</a:t>
+            </a:r>
+          </a:p>
+          <a:p>
+            <a:r>
+              <a:rPr lang="en-US" dirty="0"/>
+              <a:t>Want every line in the program exercised.  This is called </a:t>
+            </a:r>
+            <a:r>
+              <a:rPr lang="en-US" i="1" dirty="0">
+                <a:solidFill>
+                  <a:srgbClr val="FF0000"/>
+                </a:solidFill>
+              </a:rPr>
+              <a:t>100% expression coverage</a:t>
+            </a:r>
+            <a:r>
+              <a:rPr lang="en-US" dirty="0"/>
+              <a:t>.</a:t>
+            </a:r>
+          </a:p>
+          <a:p>
+            <a:r>
+              <a:rPr lang="en-US" dirty="0"/>
+              <a:t>This is our </a:t>
+            </a:r>
+            <a:r>
+              <a:rPr lang="en-US" b="1" dirty="0"/>
+              <a:t>minimum</a:t>
+            </a:r>
+            <a:r>
+              <a:rPr lang="en-US" dirty="0"/>
+              <a:t> testing requirement.</a:t>
+            </a:r>
+          </a:p>
+          <a:p>
+            <a:r>
+              <a:rPr lang="en-US" dirty="0"/>
+              <a:t>But this doesn’t necessarily test all the desired behaviors of our program.</a:t>
+            </a:r>
+          </a:p>
+          <a:p>
+            <a:r>
+              <a:rPr lang="en-US" dirty="0"/>
+              <a:t>To get a better handle on this, we introduce the idea of </a:t>
+            </a:r>
+            <a:r>
+              <a:rPr lang="en-US" i="1" dirty="0">
+                <a:solidFill>
+                  <a:srgbClr val="FF0000"/>
+                </a:solidFill>
+              </a:rPr>
+              <a:t>equivalence partitioning</a:t>
+            </a:r>
+            <a:r>
+              <a:rPr lang="en-US" dirty="0"/>
+              <a:t>.</a:t>
+            </a:r>
+          </a:p>
+        </p:txBody>
+      </p:sp>
+      <p:sp>
+        <p:nvSpPr>
+          <p:cNvPr id="4" name="Slide Number Placeholder 3"/>
           <p:cNvSpPr>
             <a:spLocks noGrp="1"/>
           </p:cNvSpPr>
@@ -5702,7 +6057,222 @@
             <a:fld id="{B6F15528-21DE-4FAA-801E-634DDDAF4B2B}" type="slidenum">
               <a:rPr lang="en-US" smtClean="0"/>
               <a:pPr/>
-              <a:t>11</a:t>
+              <a:t>12</a:t>
+            </a:fld>
+            <a:endParaRPr lang="en-US"/>
+          </a:p>
+        </p:txBody>
+      </p:sp>
+    </p:spTree>
+    <p:extLst>
+      <p:ext uri="{BB962C8B-B14F-4D97-AF65-F5344CB8AC3E}">
+        <p14:creationId xmlns:p14="http://schemas.microsoft.com/office/powerpoint/2010/main" val="2299138388"/>
+      </p:ext>
+    </p:extLst>
+  </p:cSld>
+  <p:clrMapOvr>
+    <a:masterClrMapping/>
+  </p:clrMapOvr>
+</p:sld>
+</file>
+
+<file path=ppt/slides/slide13.xml><?xml version="1.0" encoding="utf-8"?>
+<p:sld xmlns:a="http://schemas.openxmlformats.org/drawingml/2006/main" xmlns:r="http://schemas.openxmlformats.org/officeDocument/2006/relationships" xmlns:p="http://schemas.openxmlformats.org/presentationml/2006/main">
+  <p:cSld>
+    <p:spTree>
+      <p:nvGrpSpPr>
+        <p:cNvPr id="1" name=""/>
+        <p:cNvGrpSpPr/>
+        <p:nvPr/>
+      </p:nvGrpSpPr>
+      <p:grpSpPr>
+        <a:xfrm>
+          <a:off x="0" y="0"/>
+          <a:ext cx="0" cy="0"/>
+          <a:chOff x="0" y="0"/>
+          <a:chExt cx="0" cy="0"/>
+        </a:xfrm>
+      </p:grpSpPr>
+      <p:sp>
+        <p:nvSpPr>
+          <p:cNvPr id="2" name="Title 1"/>
+          <p:cNvSpPr>
+            <a:spLocks noGrp="1"/>
+          </p:cNvSpPr>
+          <p:nvPr>
+            <p:ph type="title"/>
+          </p:nvPr>
+        </p:nvSpPr>
+        <p:spPr/>
+        <p:txBody>
+          <a:bodyPr/>
+          <a:lstStyle/>
+          <a:p>
+            <a:r>
+              <a:rPr lang="en-US" dirty="0"/>
+              <a:t>Equivalence Partitioning</a:t>
+            </a:r>
+          </a:p>
+        </p:txBody>
+      </p:sp>
+      <p:sp>
+        <p:nvSpPr>
+          <p:cNvPr id="3" name="Content Placeholder 2"/>
+          <p:cNvSpPr>
+            <a:spLocks noGrp="1"/>
+          </p:cNvSpPr>
+          <p:nvPr>
+            <p:ph idx="1"/>
+          </p:nvPr>
+        </p:nvSpPr>
+        <p:spPr/>
+        <p:txBody>
+          <a:bodyPr>
+            <a:normAutofit fontScale="92500" lnSpcReduction="20000"/>
+          </a:bodyPr>
+          <a:lstStyle/>
+          <a:p>
+            <a:r>
+              <a:rPr lang="en-US" dirty="0"/>
+              <a:t>Possible arguments to your function typically fall into classes for which the program yields similar results.</a:t>
+            </a:r>
+          </a:p>
+          <a:p>
+            <a:r>
+              <a:rPr lang="en-US" dirty="0"/>
+              <a:t>Example: f2c had only 1 partition.</a:t>
+            </a:r>
+          </a:p>
+          <a:p>
+            <a:r>
+              <a:rPr lang="en-US" dirty="0"/>
+              <a:t>Example: ball-after-mouse depends on</a:t>
+            </a:r>
+          </a:p>
+          <a:p>
+            <a:pPr lvl="1"/>
+            <a:r>
+              <a:rPr lang="en-US" dirty="0"/>
+              <a:t>Which mouse event we’re dealing with</a:t>
+            </a:r>
+          </a:p>
+          <a:p>
+            <a:pPr lvl="1"/>
+            <a:r>
+              <a:rPr lang="en-US" dirty="0"/>
+              <a:t>Whether the mouse event is inside or outside the ball</a:t>
+            </a:r>
+          </a:p>
+          <a:p>
+            <a:pPr lvl="1"/>
+            <a:r>
+              <a:rPr lang="en-US" dirty="0"/>
+              <a:t>Whether the ball is selected</a:t>
+            </a:r>
+          </a:p>
+          <a:p>
+            <a:r>
+              <a:rPr lang="en-US" dirty="0"/>
+              <a:t>So we need 3 x 2 x 2 = 12 tests to cover all these combinations.</a:t>
+            </a:r>
+          </a:p>
+        </p:txBody>
+      </p:sp>
+      <p:sp>
+        <p:nvSpPr>
+          <p:cNvPr id="4" name="Slide Number Placeholder 3"/>
+          <p:cNvSpPr>
+            <a:spLocks noGrp="1"/>
+          </p:cNvSpPr>
+          <p:nvPr>
+            <p:ph type="sldNum" sz="quarter" idx="12"/>
+          </p:nvPr>
+        </p:nvSpPr>
+        <p:spPr/>
+        <p:txBody>
+          <a:bodyPr/>
+          <a:lstStyle/>
+          <a:p>
+            <a:fld id="{B6F15528-21DE-4FAA-801E-634DDDAF4B2B}" type="slidenum">
+              <a:rPr lang="en-US" smtClean="0"/>
+              <a:pPr/>
+              <a:t>13</a:t>
+            </a:fld>
+            <a:endParaRPr lang="en-US"/>
+          </a:p>
+        </p:txBody>
+      </p:sp>
+    </p:spTree>
+    <p:extLst>
+      <p:ext uri="{BB962C8B-B14F-4D97-AF65-F5344CB8AC3E}">
+        <p14:creationId xmlns:p14="http://schemas.microsoft.com/office/powerpoint/2010/main" val="1178833121"/>
+      </p:ext>
+    </p:extLst>
+  </p:cSld>
+  <p:clrMapOvr>
+    <a:masterClrMapping/>
+  </p:clrMapOvr>
+</p:sld>
+</file>
+
+<file path=ppt/slides/slide14.xml><?xml version="1.0" encoding="utf-8"?>
+<p:sld xmlns:a="http://schemas.openxmlformats.org/drawingml/2006/main" xmlns:r="http://schemas.openxmlformats.org/officeDocument/2006/relationships" xmlns:p="http://schemas.openxmlformats.org/presentationml/2006/main">
+  <p:cSld>
+    <p:spTree>
+      <p:nvGrpSpPr>
+        <p:cNvPr id="1" name=""/>
+        <p:cNvGrpSpPr/>
+        <p:nvPr/>
+      </p:nvGrpSpPr>
+      <p:grpSpPr>
+        <a:xfrm>
+          <a:off x="0" y="0"/>
+          <a:ext cx="0" cy="0"/>
+          <a:chOff x="0" y="0"/>
+          <a:chExt cx="0" cy="0"/>
+        </a:xfrm>
+      </p:grpSpPr>
+      <p:sp>
+        <p:nvSpPr>
+          <p:cNvPr id="2" name="Title 1"/>
+          <p:cNvSpPr>
+            <a:spLocks noGrp="1"/>
+          </p:cNvSpPr>
+          <p:nvPr>
+            <p:ph type="title"/>
+          </p:nvPr>
+        </p:nvSpPr>
+        <p:spPr/>
+        <p:txBody>
+          <a:bodyPr/>
+          <a:lstStyle/>
+          <a:p>
+            <a:r>
+              <a:rPr lang="en-US" dirty="0"/>
+              <a:t>Equivalence Partitioning</a:t>
+            </a:r>
+          </a:p>
+        </p:txBody>
+      </p:sp>
+      <p:sp>
+        <p:nvSpPr>
+          <p:cNvPr id="3" name="Slide Number Placeholder 2"/>
+          <p:cNvSpPr>
+            <a:spLocks noGrp="1"/>
+          </p:cNvSpPr>
+          <p:nvPr>
+            <p:ph type="sldNum" sz="quarter" idx="12"/>
+          </p:nvPr>
+        </p:nvSpPr>
+        <p:spPr/>
+        <p:txBody>
+          <a:bodyPr/>
+          <a:lstStyle/>
+          <a:p>
+            <a:fld id="{B6F15528-21DE-4FAA-801E-634DDDAF4B2B}" type="slidenum">
+              <a:rPr lang="en-US" smtClean="0"/>
+              <a:pPr/>
+              <a:t>14</a:t>
             </a:fld>
             <a:endParaRPr lang="en-US"/>
           </a:p>
@@ -6103,1413 +6673,6 @@
 </p:sld>
 </file>
 
-<file path=ppt/slides/slide12.xml><?xml version="1.0" encoding="utf-8"?>
-<p:sld xmlns:a="http://schemas.openxmlformats.org/drawingml/2006/main" xmlns:r="http://schemas.openxmlformats.org/officeDocument/2006/relationships" xmlns:p="http://schemas.openxmlformats.org/presentationml/2006/main">
-  <p:cSld>
-    <p:spTree>
-      <p:nvGrpSpPr>
-        <p:cNvPr id="1" name=""/>
-        <p:cNvGrpSpPr/>
-        <p:nvPr/>
-      </p:nvGrpSpPr>
-      <p:grpSpPr>
-        <a:xfrm>
-          <a:off x="0" y="0"/>
-          <a:ext cx="0" cy="0"/>
-          <a:chOff x="0" y="0"/>
-          <a:chExt cx="0" cy="0"/>
-        </a:xfrm>
-      </p:grpSpPr>
-      <p:sp>
-        <p:nvSpPr>
-          <p:cNvPr id="2" name="Title 1"/>
-          <p:cNvSpPr>
-            <a:spLocks noGrp="1"/>
-          </p:cNvSpPr>
-          <p:nvPr>
-            <p:ph type="title"/>
-          </p:nvPr>
-        </p:nvSpPr>
-        <p:spPr/>
-        <p:txBody>
-          <a:bodyPr/>
-          <a:lstStyle/>
-          <a:p>
-            <a:r>
-              <a:rPr lang="en-US" dirty="0"/>
-              <a:t>Boundary Testing</a:t>
-            </a:r>
-          </a:p>
-        </p:txBody>
-      </p:sp>
-      <p:sp>
-        <p:nvSpPr>
-          <p:cNvPr id="3" name="Slide Number Placeholder 2"/>
-          <p:cNvSpPr>
-            <a:spLocks noGrp="1"/>
-          </p:cNvSpPr>
-          <p:nvPr>
-            <p:ph type="sldNum" sz="quarter" idx="12"/>
-          </p:nvPr>
-        </p:nvSpPr>
-        <p:spPr/>
-        <p:txBody>
-          <a:bodyPr/>
-          <a:lstStyle/>
-          <a:p>
-            <a:fld id="{B6F15528-21DE-4FAA-801E-634DDDAF4B2B}" type="slidenum">
-              <a:rPr lang="en-US" smtClean="0"/>
-              <a:pPr/>
-              <a:t>12</a:t>
-            </a:fld>
-            <a:endParaRPr lang="en-US"/>
-          </a:p>
-        </p:txBody>
-      </p:sp>
-      <p:sp>
-        <p:nvSpPr>
-          <p:cNvPr id="6" name="Content Placeholder 2"/>
-          <p:cNvSpPr txBox="1">
-            <a:spLocks/>
-          </p:cNvSpPr>
-          <p:nvPr/>
-        </p:nvSpPr>
-        <p:spPr>
-          <a:xfrm>
-            <a:off x="457200" y="1600200"/>
-            <a:ext cx="8229600" cy="4525963"/>
-          </a:xfrm>
-          <a:prstGeom prst="rect">
-            <a:avLst/>
-          </a:prstGeom>
-        </p:spPr>
-        <p:txBody>
-          <a:bodyPr vert="horz" lIns="91440" tIns="45720" rIns="91440" bIns="45720" rtlCol="0">
-            <a:normAutofit fontScale="92500"/>
-          </a:bodyPr>
-          <a:lstStyle>
-            <a:lvl1pPr marL="342900" indent="-342900" algn="l" defTabSz="914400" rtl="0" eaLnBrk="1" latinLnBrk="0" hangingPunct="1">
-              <a:spcBef>
-                <a:spcPct val="20000"/>
-              </a:spcBef>
-              <a:buFont typeface="Arial" pitchFamily="34" charset="0"/>
-              <a:buChar char="•"/>
-              <a:defRPr sz="3200" kern="1200">
-                <a:solidFill>
-                  <a:schemeClr val="tx1"/>
-                </a:solidFill>
-                <a:latin typeface="+mn-lt"/>
-                <a:ea typeface="+mn-ea"/>
-                <a:cs typeface="+mn-cs"/>
-              </a:defRPr>
-            </a:lvl1pPr>
-            <a:lvl2pPr marL="742950" indent="-285750" algn="l" defTabSz="914400" rtl="0" eaLnBrk="1" latinLnBrk="0" hangingPunct="1">
-              <a:spcBef>
-                <a:spcPct val="20000"/>
-              </a:spcBef>
-              <a:buFont typeface="Arial" pitchFamily="34" charset="0"/>
-              <a:buChar char="–"/>
-              <a:defRPr sz="2800" kern="1200">
-                <a:solidFill>
-                  <a:schemeClr val="tx1"/>
-                </a:solidFill>
-                <a:latin typeface="+mn-lt"/>
-                <a:ea typeface="+mn-ea"/>
-                <a:cs typeface="+mn-cs"/>
-              </a:defRPr>
-            </a:lvl2pPr>
-            <a:lvl3pPr marL="1143000" indent="-228600" algn="l" defTabSz="914400" rtl="0" eaLnBrk="1" latinLnBrk="0" hangingPunct="1">
-              <a:spcBef>
-                <a:spcPct val="20000"/>
-              </a:spcBef>
-              <a:buFont typeface="Arial" pitchFamily="34" charset="0"/>
-              <a:buChar char="•"/>
-              <a:defRPr sz="2400" kern="1200">
-                <a:solidFill>
-                  <a:schemeClr val="tx1"/>
-                </a:solidFill>
-                <a:latin typeface="+mn-lt"/>
-                <a:ea typeface="+mn-ea"/>
-                <a:cs typeface="+mn-cs"/>
-              </a:defRPr>
-            </a:lvl3pPr>
-            <a:lvl4pPr marL="1600200" indent="-228600" algn="l" defTabSz="914400" rtl="0" eaLnBrk="1" latinLnBrk="0" hangingPunct="1">
-              <a:spcBef>
-                <a:spcPct val="20000"/>
-              </a:spcBef>
-              <a:buFont typeface="Arial" pitchFamily="34" charset="0"/>
-              <a:buChar char="–"/>
-              <a:defRPr sz="2000" kern="1200">
-                <a:solidFill>
-                  <a:schemeClr val="tx1"/>
-                </a:solidFill>
-                <a:latin typeface="+mn-lt"/>
-                <a:ea typeface="+mn-ea"/>
-                <a:cs typeface="+mn-cs"/>
-              </a:defRPr>
-            </a:lvl4pPr>
-            <a:lvl5pPr marL="2057400" indent="-228600" algn="l" defTabSz="914400" rtl="0" eaLnBrk="1" latinLnBrk="0" hangingPunct="1">
-              <a:spcBef>
-                <a:spcPct val="20000"/>
-              </a:spcBef>
-              <a:buFont typeface="Arial" pitchFamily="34" charset="0"/>
-              <a:buChar char="»"/>
-              <a:defRPr sz="2000" kern="1200">
-                <a:solidFill>
-                  <a:schemeClr val="tx1"/>
-                </a:solidFill>
-                <a:latin typeface="+mn-lt"/>
-                <a:ea typeface="+mn-ea"/>
-                <a:cs typeface="+mn-cs"/>
-              </a:defRPr>
-            </a:lvl5pPr>
-            <a:lvl6pPr marL="2514600" indent="-228600" algn="l" defTabSz="914400" rtl="0" eaLnBrk="1" latinLnBrk="0" hangingPunct="1">
-              <a:spcBef>
-                <a:spcPct val="20000"/>
-              </a:spcBef>
-              <a:buFont typeface="Arial" pitchFamily="34" charset="0"/>
-              <a:buChar char="•"/>
-              <a:defRPr sz="2000" kern="1200">
-                <a:solidFill>
-                  <a:schemeClr val="tx1"/>
-                </a:solidFill>
-                <a:latin typeface="+mn-lt"/>
-                <a:ea typeface="+mn-ea"/>
-                <a:cs typeface="+mn-cs"/>
-              </a:defRPr>
-            </a:lvl6pPr>
-            <a:lvl7pPr marL="2971800" indent="-228600" algn="l" defTabSz="914400" rtl="0" eaLnBrk="1" latinLnBrk="0" hangingPunct="1">
-              <a:spcBef>
-                <a:spcPct val="20000"/>
-              </a:spcBef>
-              <a:buFont typeface="Arial" pitchFamily="34" charset="0"/>
-              <a:buChar char="•"/>
-              <a:defRPr sz="2000" kern="1200">
-                <a:solidFill>
-                  <a:schemeClr val="tx1"/>
-                </a:solidFill>
-                <a:latin typeface="+mn-lt"/>
-                <a:ea typeface="+mn-ea"/>
-                <a:cs typeface="+mn-cs"/>
-              </a:defRPr>
-            </a:lvl7pPr>
-            <a:lvl8pPr marL="3429000" indent="-228600" algn="l" defTabSz="914400" rtl="0" eaLnBrk="1" latinLnBrk="0" hangingPunct="1">
-              <a:spcBef>
-                <a:spcPct val="20000"/>
-              </a:spcBef>
-              <a:buFont typeface="Arial" pitchFamily="34" charset="0"/>
-              <a:buChar char="•"/>
-              <a:defRPr sz="2000" kern="1200">
-                <a:solidFill>
-                  <a:schemeClr val="tx1"/>
-                </a:solidFill>
-                <a:latin typeface="+mn-lt"/>
-                <a:ea typeface="+mn-ea"/>
-                <a:cs typeface="+mn-cs"/>
-              </a:defRPr>
-            </a:lvl8pPr>
-            <a:lvl9pPr marL="3886200" indent="-228600" algn="l" defTabSz="914400" rtl="0" eaLnBrk="1" latinLnBrk="0" hangingPunct="1">
-              <a:spcBef>
-                <a:spcPct val="20000"/>
-              </a:spcBef>
-              <a:buFont typeface="Arial" pitchFamily="34" charset="0"/>
-              <a:buChar char="•"/>
-              <a:defRPr sz="2000" kern="1200">
-                <a:solidFill>
-                  <a:schemeClr val="tx1"/>
-                </a:solidFill>
-                <a:latin typeface="+mn-lt"/>
-                <a:ea typeface="+mn-ea"/>
-                <a:cs typeface="+mn-cs"/>
-              </a:defRPr>
-            </a:lvl9pPr>
-          </a:lstStyle>
-          <a:p>
-            <a:r>
-              <a:rPr lang="en-US" dirty="0"/>
-              <a:t>Want to make sure that the boundaries between these equivalence classes are in the right place.</a:t>
-            </a:r>
-          </a:p>
-          <a:p>
-            <a:r>
-              <a:rPr lang="en-US" dirty="0"/>
-              <a:t>Example: </a:t>
-            </a:r>
-            <a:r>
-              <a:rPr lang="en-US" dirty="0" err="1"/>
-              <a:t>int</a:t>
-            </a:r>
-            <a:r>
-              <a:rPr lang="en-US" dirty="0"/>
-              <a:t>-square-root</a:t>
-            </a:r>
-          </a:p>
-          <a:p>
-            <a:pPr lvl="1"/>
-            <a:r>
-              <a:rPr lang="en-US" b="1" dirty="0">
-                <a:latin typeface="Consolas" pitchFamily="49" charset="0"/>
-                <a:cs typeface="Consolas" pitchFamily="49" charset="0"/>
-              </a:rPr>
-              <a:t>(</a:t>
-            </a:r>
-            <a:r>
-              <a:rPr lang="en-US" b="1" dirty="0" err="1">
-                <a:latin typeface="Consolas" pitchFamily="49" charset="0"/>
-                <a:cs typeface="Consolas" pitchFamily="49" charset="0"/>
-              </a:rPr>
-              <a:t>int</a:t>
-            </a:r>
-            <a:r>
-              <a:rPr lang="en-US" b="1" dirty="0">
-                <a:latin typeface="Consolas" pitchFamily="49" charset="0"/>
-                <a:cs typeface="Consolas" pitchFamily="49" charset="0"/>
-              </a:rPr>
-              <a:t>-square-root 24) = 4</a:t>
-            </a:r>
-          </a:p>
-          <a:p>
-            <a:pPr lvl="1"/>
-            <a:r>
-              <a:rPr lang="en-US" b="1" dirty="0">
-                <a:latin typeface="Consolas" pitchFamily="49" charset="0"/>
-                <a:cs typeface="Consolas" pitchFamily="49" charset="0"/>
-              </a:rPr>
-              <a:t>(</a:t>
-            </a:r>
-            <a:r>
-              <a:rPr lang="en-US" b="1" dirty="0" err="1">
-                <a:latin typeface="Consolas" pitchFamily="49" charset="0"/>
-                <a:cs typeface="Consolas" pitchFamily="49" charset="0"/>
-              </a:rPr>
-              <a:t>int</a:t>
-            </a:r>
-            <a:r>
-              <a:rPr lang="en-US" b="1" dirty="0">
-                <a:latin typeface="Consolas" pitchFamily="49" charset="0"/>
-                <a:cs typeface="Consolas" pitchFamily="49" charset="0"/>
-              </a:rPr>
-              <a:t>-square-root 25) = 5</a:t>
-            </a:r>
-          </a:p>
-          <a:p>
-            <a:pPr lvl="1"/>
-            <a:r>
-              <a:rPr lang="en-US" b="1" dirty="0">
-                <a:latin typeface="Consolas" pitchFamily="49" charset="0"/>
-                <a:cs typeface="Consolas" pitchFamily="49" charset="0"/>
-              </a:rPr>
-              <a:t>(</a:t>
-            </a:r>
-            <a:r>
-              <a:rPr lang="en-US" b="1" dirty="0" err="1">
-                <a:latin typeface="Consolas" pitchFamily="49" charset="0"/>
-                <a:cs typeface="Consolas" pitchFamily="49" charset="0"/>
-              </a:rPr>
-              <a:t>int</a:t>
-            </a:r>
-            <a:r>
-              <a:rPr lang="en-US" b="1" dirty="0">
-                <a:latin typeface="Consolas" pitchFamily="49" charset="0"/>
-                <a:cs typeface="Consolas" pitchFamily="49" charset="0"/>
-              </a:rPr>
-              <a:t>-square-root 26) = 5</a:t>
-            </a:r>
-          </a:p>
-          <a:p>
-            <a:pPr lvl="1"/>
-            <a:r>
-              <a:rPr lang="en-US" b="1" dirty="0">
-                <a:latin typeface="Consolas" pitchFamily="49" charset="0"/>
-                <a:cs typeface="Consolas" pitchFamily="49" charset="0"/>
-              </a:rPr>
-              <a:t>...</a:t>
-            </a:r>
-          </a:p>
-          <a:p>
-            <a:pPr lvl="1"/>
-            <a:r>
-              <a:rPr lang="en-US" b="1" dirty="0">
-                <a:latin typeface="Consolas" pitchFamily="49" charset="0"/>
-                <a:cs typeface="Consolas" pitchFamily="49" charset="0"/>
-              </a:rPr>
-              <a:t>(</a:t>
-            </a:r>
-            <a:r>
-              <a:rPr lang="en-US" b="1" dirty="0" err="1">
-                <a:latin typeface="Consolas" pitchFamily="49" charset="0"/>
-                <a:cs typeface="Consolas" pitchFamily="49" charset="0"/>
-              </a:rPr>
-              <a:t>int</a:t>
-            </a:r>
-            <a:r>
-              <a:rPr lang="en-US" b="1" dirty="0">
-                <a:latin typeface="Consolas" pitchFamily="49" charset="0"/>
-                <a:cs typeface="Consolas" pitchFamily="49" charset="0"/>
-              </a:rPr>
-              <a:t>-square-root 35) = 5</a:t>
-            </a:r>
-          </a:p>
-          <a:p>
-            <a:pPr lvl="1"/>
-            <a:r>
-              <a:rPr lang="en-US" b="1" dirty="0">
-                <a:latin typeface="Consolas" pitchFamily="49" charset="0"/>
-                <a:cs typeface="Consolas" pitchFamily="49" charset="0"/>
-              </a:rPr>
-              <a:t>(</a:t>
-            </a:r>
-            <a:r>
-              <a:rPr lang="en-US" b="1" dirty="0" err="1">
-                <a:latin typeface="Consolas" pitchFamily="49" charset="0"/>
-                <a:cs typeface="Consolas" pitchFamily="49" charset="0"/>
-              </a:rPr>
-              <a:t>int</a:t>
-            </a:r>
-            <a:r>
-              <a:rPr lang="en-US" b="1" dirty="0">
-                <a:latin typeface="Consolas" pitchFamily="49" charset="0"/>
-                <a:cs typeface="Consolas" pitchFamily="49" charset="0"/>
-              </a:rPr>
-              <a:t>-square-root 36) = 6</a:t>
-            </a:r>
-          </a:p>
-        </p:txBody>
-      </p:sp>
-      <p:grpSp>
-        <p:nvGrpSpPr>
-          <p:cNvPr id="11" name="Group 10"/>
-          <p:cNvGrpSpPr/>
-          <p:nvPr/>
-        </p:nvGrpSpPr>
-        <p:grpSpPr>
-          <a:xfrm>
-            <a:off x="5648960" y="3429000"/>
-            <a:ext cx="2306320" cy="467360"/>
-            <a:chOff x="5648960" y="3429000"/>
-            <a:chExt cx="2306320" cy="467360"/>
-          </a:xfrm>
-        </p:grpSpPr>
-        <p:sp>
-          <p:nvSpPr>
-            <p:cNvPr id="7" name="Rectangle 6"/>
-            <p:cNvSpPr/>
-            <p:nvPr/>
-          </p:nvSpPr>
-          <p:spPr>
-            <a:xfrm>
-              <a:off x="6421120" y="3429000"/>
-              <a:ext cx="1534160" cy="467360"/>
-            </a:xfrm>
-            <a:prstGeom prst="rect">
-              <a:avLst/>
-            </a:prstGeom>
-          </p:spPr>
-          <p:style>
-            <a:lnRef idx="1">
-              <a:schemeClr val="accent1"/>
-            </a:lnRef>
-            <a:fillRef idx="2">
-              <a:schemeClr val="accent1"/>
-            </a:fillRef>
-            <a:effectRef idx="1">
-              <a:schemeClr val="accent1"/>
-            </a:effectRef>
-            <a:fontRef idx="minor">
-              <a:schemeClr val="dk1"/>
-            </a:fontRef>
-          </p:style>
-          <p:txBody>
-            <a:bodyPr rtlCol="0" anchor="ctr"/>
-            <a:lstStyle/>
-            <a:p>
-              <a:pPr algn="ctr"/>
-              <a:r>
-                <a:rPr lang="en-US" dirty="0"/>
-                <a:t>boundary</a:t>
-              </a:r>
-            </a:p>
-          </p:txBody>
-        </p:sp>
-        <p:cxnSp>
-          <p:nvCxnSpPr>
-            <p:cNvPr id="9" name="Straight Arrow Connector 8"/>
-            <p:cNvCxnSpPr>
-              <a:stCxn id="7" idx="1"/>
-            </p:cNvCxnSpPr>
-            <p:nvPr/>
-          </p:nvCxnSpPr>
-          <p:spPr>
-            <a:xfrm flipH="1">
-              <a:off x="5648960" y="3662680"/>
-              <a:ext cx="772160" cy="0"/>
-            </a:xfrm>
-            <a:prstGeom prst="straightConnector1">
-              <a:avLst/>
-            </a:prstGeom>
-            <a:ln>
-              <a:solidFill>
-                <a:schemeClr val="accent2"/>
-              </a:solidFill>
-              <a:tailEnd type="arrow"/>
-            </a:ln>
-          </p:spPr>
-          <p:style>
-            <a:lnRef idx="2">
-              <a:schemeClr val="accent1"/>
-            </a:lnRef>
-            <a:fillRef idx="0">
-              <a:schemeClr val="accent1"/>
-            </a:fillRef>
-            <a:effectRef idx="1">
-              <a:schemeClr val="accent1"/>
-            </a:effectRef>
-            <a:fontRef idx="minor">
-              <a:schemeClr val="tx1"/>
-            </a:fontRef>
-          </p:style>
-        </p:cxnSp>
-      </p:grpSp>
-      <p:grpSp>
-        <p:nvGrpSpPr>
-          <p:cNvPr id="12" name="Group 11"/>
-          <p:cNvGrpSpPr/>
-          <p:nvPr/>
-        </p:nvGrpSpPr>
-        <p:grpSpPr>
-          <a:xfrm>
-            <a:off x="5913120" y="5252720"/>
-            <a:ext cx="2306320" cy="467360"/>
-            <a:chOff x="5913120" y="5252720"/>
-            <a:chExt cx="2306320" cy="467360"/>
-          </a:xfrm>
-        </p:grpSpPr>
-        <p:sp>
-          <p:nvSpPr>
-            <p:cNvPr id="8" name="Rectangle 7"/>
-            <p:cNvSpPr/>
-            <p:nvPr/>
-          </p:nvSpPr>
-          <p:spPr>
-            <a:xfrm>
-              <a:off x="6685280" y="5252720"/>
-              <a:ext cx="1534160" cy="467360"/>
-            </a:xfrm>
-            <a:prstGeom prst="rect">
-              <a:avLst/>
-            </a:prstGeom>
-          </p:spPr>
-          <p:style>
-            <a:lnRef idx="1">
-              <a:schemeClr val="accent1"/>
-            </a:lnRef>
-            <a:fillRef idx="2">
-              <a:schemeClr val="accent1"/>
-            </a:fillRef>
-            <a:effectRef idx="1">
-              <a:schemeClr val="accent1"/>
-            </a:effectRef>
-            <a:fontRef idx="minor">
-              <a:schemeClr val="dk1"/>
-            </a:fontRef>
-          </p:style>
-          <p:txBody>
-            <a:bodyPr rtlCol="0" anchor="ctr"/>
-            <a:lstStyle/>
-            <a:p>
-              <a:pPr algn="ctr"/>
-              <a:r>
-                <a:rPr lang="en-US" dirty="0"/>
-                <a:t>boundary</a:t>
-              </a:r>
-            </a:p>
-          </p:txBody>
-        </p:sp>
-        <p:cxnSp>
-          <p:nvCxnSpPr>
-            <p:cNvPr id="10" name="Straight Arrow Connector 9"/>
-            <p:cNvCxnSpPr>
-              <a:stCxn id="8" idx="1"/>
-            </p:cNvCxnSpPr>
-            <p:nvPr/>
-          </p:nvCxnSpPr>
-          <p:spPr>
-            <a:xfrm flipH="1">
-              <a:off x="5913120" y="5486400"/>
-              <a:ext cx="772160" cy="0"/>
-            </a:xfrm>
-            <a:prstGeom prst="straightConnector1">
-              <a:avLst/>
-            </a:prstGeom>
-            <a:ln>
-              <a:solidFill>
-                <a:schemeClr val="accent2"/>
-              </a:solidFill>
-              <a:tailEnd type="arrow"/>
-            </a:ln>
-          </p:spPr>
-          <p:style>
-            <a:lnRef idx="2">
-              <a:schemeClr val="accent1"/>
-            </a:lnRef>
-            <a:fillRef idx="0">
-              <a:schemeClr val="accent1"/>
-            </a:fillRef>
-            <a:effectRef idx="1">
-              <a:schemeClr val="accent1"/>
-            </a:effectRef>
-            <a:fontRef idx="minor">
-              <a:schemeClr val="tx1"/>
-            </a:fontRef>
-          </p:style>
-        </p:cxnSp>
-      </p:grpSp>
-    </p:spTree>
-    <p:extLst>
-      <p:ext uri="{BB962C8B-B14F-4D97-AF65-F5344CB8AC3E}">
-        <p14:creationId xmlns:p14="http://schemas.microsoft.com/office/powerpoint/2010/main" val="2845942675"/>
-      </p:ext>
-    </p:extLst>
-  </p:cSld>
-  <p:clrMapOvr>
-    <a:masterClrMapping/>
-  </p:clrMapOvr>
-</p:sld>
-</file>
-
-<file path=ppt/slides/slide13.xml><?xml version="1.0" encoding="utf-8"?>
-<p:sld xmlns:a="http://schemas.openxmlformats.org/drawingml/2006/main" xmlns:r="http://schemas.openxmlformats.org/officeDocument/2006/relationships" xmlns:p="http://schemas.openxmlformats.org/presentationml/2006/main">
-  <p:cSld>
-    <p:spTree>
-      <p:nvGrpSpPr>
-        <p:cNvPr id="1" name=""/>
-        <p:cNvGrpSpPr/>
-        <p:nvPr/>
-      </p:nvGrpSpPr>
-      <p:grpSpPr>
-        <a:xfrm>
-          <a:off x="0" y="0"/>
-          <a:ext cx="0" cy="0"/>
-          <a:chOff x="0" y="0"/>
-          <a:chExt cx="0" cy="0"/>
-        </a:xfrm>
-      </p:grpSpPr>
-      <p:sp>
-        <p:nvSpPr>
-          <p:cNvPr id="2" name="Title 1"/>
-          <p:cNvSpPr>
-            <a:spLocks noGrp="1"/>
-          </p:cNvSpPr>
-          <p:nvPr>
-            <p:ph type="title"/>
-          </p:nvPr>
-        </p:nvSpPr>
-        <p:spPr/>
-        <p:txBody>
-          <a:bodyPr/>
-          <a:lstStyle/>
-          <a:p>
-            <a:r>
-              <a:rPr lang="en-US" dirty="0"/>
-              <a:t>Boundary Testing</a:t>
-            </a:r>
-          </a:p>
-        </p:txBody>
-      </p:sp>
-      <p:sp>
-        <p:nvSpPr>
-          <p:cNvPr id="3" name="Slide Number Placeholder 2"/>
-          <p:cNvSpPr>
-            <a:spLocks noGrp="1"/>
-          </p:cNvSpPr>
-          <p:nvPr>
-            <p:ph type="sldNum" sz="quarter" idx="12"/>
-          </p:nvPr>
-        </p:nvSpPr>
-        <p:spPr/>
-        <p:txBody>
-          <a:bodyPr/>
-          <a:lstStyle/>
-          <a:p>
-            <a:fld id="{B6F15528-21DE-4FAA-801E-634DDDAF4B2B}" type="slidenum">
-              <a:rPr lang="en-US" smtClean="0"/>
-              <a:pPr/>
-              <a:t>13</a:t>
-            </a:fld>
-            <a:endParaRPr lang="en-US"/>
-          </a:p>
-        </p:txBody>
-      </p:sp>
-      <p:sp>
-        <p:nvSpPr>
-          <p:cNvPr id="5" name="Rectangle 4"/>
-          <p:cNvSpPr/>
-          <p:nvPr/>
-        </p:nvSpPr>
-        <p:spPr>
-          <a:xfrm>
-            <a:off x="1873624" y="1649506"/>
-            <a:ext cx="5396753" cy="3908612"/>
-          </a:xfrm>
-          <a:prstGeom prst="rect">
-            <a:avLst/>
-          </a:prstGeom>
-        </p:spPr>
-        <p:style>
-          <a:lnRef idx="2">
-            <a:schemeClr val="dk1"/>
-          </a:lnRef>
-          <a:fillRef idx="1">
-            <a:schemeClr val="lt1"/>
-          </a:fillRef>
-          <a:effectRef idx="0">
-            <a:schemeClr val="dk1"/>
-          </a:effectRef>
-          <a:fontRef idx="minor">
-            <a:schemeClr val="dk1"/>
-          </a:fontRef>
-        </p:style>
-        <p:txBody>
-          <a:bodyPr rtlCol="0" anchor="ctr"/>
-          <a:lstStyle/>
-          <a:p>
-            <a:pPr algn="ctr"/>
-            <a:endParaRPr lang="en-US" dirty="0"/>
-          </a:p>
-        </p:txBody>
-      </p:sp>
-      <p:cxnSp>
-        <p:nvCxnSpPr>
-          <p:cNvPr id="7" name="Straight Connector 6"/>
-          <p:cNvCxnSpPr/>
-          <p:nvPr/>
-        </p:nvCxnSpPr>
-        <p:spPr>
-          <a:xfrm>
-            <a:off x="3639671" y="1649506"/>
-            <a:ext cx="1595717" cy="3908612"/>
-          </a:xfrm>
-          <a:prstGeom prst="line">
-            <a:avLst/>
-          </a:prstGeom>
-        </p:spPr>
-        <p:style>
-          <a:lnRef idx="2">
-            <a:schemeClr val="accent1"/>
-          </a:lnRef>
-          <a:fillRef idx="0">
-            <a:schemeClr val="accent1"/>
-          </a:fillRef>
-          <a:effectRef idx="1">
-            <a:schemeClr val="accent1"/>
-          </a:effectRef>
-          <a:fontRef idx="minor">
-            <a:schemeClr val="tx1"/>
-          </a:fontRef>
-        </p:style>
-      </p:cxnSp>
-      <p:cxnSp>
-        <p:nvCxnSpPr>
-          <p:cNvPr id="9" name="Straight Connector 8"/>
-          <p:cNvCxnSpPr/>
-          <p:nvPr/>
-        </p:nvCxnSpPr>
-        <p:spPr>
-          <a:xfrm flipH="1">
-            <a:off x="1873624" y="1649506"/>
-            <a:ext cx="4491317" cy="3316941"/>
-          </a:xfrm>
-          <a:prstGeom prst="line">
-            <a:avLst/>
-          </a:prstGeom>
-        </p:spPr>
-        <p:style>
-          <a:lnRef idx="2">
-            <a:schemeClr val="accent1"/>
-          </a:lnRef>
-          <a:fillRef idx="0">
-            <a:schemeClr val="accent1"/>
-          </a:fillRef>
-          <a:effectRef idx="1">
-            <a:schemeClr val="accent1"/>
-          </a:effectRef>
-          <a:fontRef idx="minor">
-            <a:schemeClr val="tx1"/>
-          </a:fontRef>
-        </p:style>
-      </p:cxnSp>
-      <p:cxnSp>
-        <p:nvCxnSpPr>
-          <p:cNvPr id="11" name="Straight Connector 10"/>
-          <p:cNvCxnSpPr/>
-          <p:nvPr/>
-        </p:nvCxnSpPr>
-        <p:spPr>
-          <a:xfrm>
-            <a:off x="5593976" y="2223247"/>
-            <a:ext cx="1676401" cy="3334871"/>
-          </a:xfrm>
-          <a:prstGeom prst="line">
-            <a:avLst/>
-          </a:prstGeom>
-        </p:spPr>
-        <p:style>
-          <a:lnRef idx="2">
-            <a:schemeClr val="accent1"/>
-          </a:lnRef>
-          <a:fillRef idx="0">
-            <a:schemeClr val="accent1"/>
-          </a:fillRef>
-          <a:effectRef idx="1">
-            <a:schemeClr val="accent1"/>
-          </a:effectRef>
-          <a:fontRef idx="minor">
-            <a:schemeClr val="tx1"/>
-          </a:fontRef>
-        </p:style>
-      </p:cxnSp>
-      <p:cxnSp>
-        <p:nvCxnSpPr>
-          <p:cNvPr id="13" name="Straight Connector 12"/>
-          <p:cNvCxnSpPr/>
-          <p:nvPr/>
-        </p:nvCxnSpPr>
-        <p:spPr>
-          <a:xfrm flipV="1">
-            <a:off x="1873624" y="2850776"/>
-            <a:ext cx="5396753" cy="53789"/>
-          </a:xfrm>
-          <a:prstGeom prst="line">
-            <a:avLst/>
-          </a:prstGeom>
-        </p:spPr>
-        <p:style>
-          <a:lnRef idx="2">
-            <a:schemeClr val="accent1"/>
-          </a:lnRef>
-          <a:fillRef idx="0">
-            <a:schemeClr val="accent1"/>
-          </a:fillRef>
-          <a:effectRef idx="1">
-            <a:schemeClr val="accent1"/>
-          </a:effectRef>
-          <a:fontRef idx="minor">
-            <a:schemeClr val="tx1"/>
-          </a:fontRef>
-        </p:style>
-      </p:cxnSp>
-      <p:sp>
-        <p:nvSpPr>
-          <p:cNvPr id="14" name="TextBox 13"/>
-          <p:cNvSpPr txBox="1"/>
-          <p:nvPr/>
-        </p:nvSpPr>
-        <p:spPr>
-          <a:xfrm>
-            <a:off x="457200" y="1093694"/>
-            <a:ext cx="2715936" cy="369332"/>
-          </a:xfrm>
-          <a:prstGeom prst="rect">
-            <a:avLst/>
-          </a:prstGeom>
-        </p:spPr>
-        <p:style>
-          <a:lnRef idx="1">
-            <a:schemeClr val="accent1"/>
-          </a:lnRef>
-          <a:fillRef idx="2">
-            <a:schemeClr val="accent1"/>
-          </a:fillRef>
-          <a:effectRef idx="1">
-            <a:schemeClr val="accent1"/>
-          </a:effectRef>
-          <a:fontRef idx="minor">
-            <a:schemeClr val="dk1"/>
-          </a:fontRef>
-        </p:style>
-        <p:txBody>
-          <a:bodyPr wrap="none" rtlCol="0">
-            <a:spAutoFit/>
-          </a:bodyPr>
-          <a:lstStyle/>
-          <a:p>
-            <a:r>
-              <a:rPr lang="en-US" dirty="0"/>
-              <a:t>Regions of similar behavior</a:t>
-            </a:r>
-          </a:p>
-        </p:txBody>
-      </p:sp>
-      <p:sp>
-        <p:nvSpPr>
-          <p:cNvPr id="17" name="Oval 16"/>
-          <p:cNvSpPr/>
-          <p:nvPr/>
-        </p:nvSpPr>
-        <p:spPr>
-          <a:xfrm>
-            <a:off x="2084295" y="2514599"/>
-            <a:ext cx="282388" cy="295836"/>
-          </a:xfrm>
-          <a:prstGeom prst="ellipse">
-            <a:avLst/>
-          </a:prstGeom>
-          <a:solidFill>
-            <a:schemeClr val="tx1"/>
-          </a:solidFill>
-        </p:spPr>
-        <p:style>
-          <a:lnRef idx="1">
-            <a:schemeClr val="accent1"/>
-          </a:lnRef>
-          <a:fillRef idx="3">
-            <a:schemeClr val="accent1"/>
-          </a:fillRef>
-          <a:effectRef idx="2">
-            <a:schemeClr val="accent1"/>
-          </a:effectRef>
-          <a:fontRef idx="minor">
-            <a:schemeClr val="lt1"/>
-          </a:fontRef>
-        </p:style>
-        <p:txBody>
-          <a:bodyPr rtlCol="0" anchor="ctr"/>
-          <a:lstStyle/>
-          <a:p>
-            <a:pPr algn="ctr"/>
-            <a:endParaRPr lang="en-US"/>
-          </a:p>
-        </p:txBody>
-      </p:sp>
-      <p:sp>
-        <p:nvSpPr>
-          <p:cNvPr id="18" name="Oval 17"/>
-          <p:cNvSpPr/>
-          <p:nvPr/>
-        </p:nvSpPr>
-        <p:spPr>
-          <a:xfrm>
-            <a:off x="2084295" y="3012140"/>
-            <a:ext cx="282388" cy="295836"/>
-          </a:xfrm>
-          <a:prstGeom prst="ellipse">
-            <a:avLst/>
-          </a:prstGeom>
-          <a:solidFill>
-            <a:schemeClr val="tx1"/>
-          </a:solidFill>
-        </p:spPr>
-        <p:style>
-          <a:lnRef idx="1">
-            <a:schemeClr val="accent1"/>
-          </a:lnRef>
-          <a:fillRef idx="3">
-            <a:schemeClr val="accent1"/>
-          </a:fillRef>
-          <a:effectRef idx="2">
-            <a:schemeClr val="accent1"/>
-          </a:effectRef>
-          <a:fontRef idx="minor">
-            <a:schemeClr val="lt1"/>
-          </a:fontRef>
-        </p:style>
-        <p:txBody>
-          <a:bodyPr rtlCol="0" anchor="ctr"/>
-          <a:lstStyle/>
-          <a:p>
-            <a:pPr algn="ctr"/>
-            <a:endParaRPr lang="en-US"/>
-          </a:p>
-        </p:txBody>
-      </p:sp>
-      <p:sp>
-        <p:nvSpPr>
-          <p:cNvPr id="15" name="Oval 14"/>
-          <p:cNvSpPr/>
-          <p:nvPr/>
-        </p:nvSpPr>
-        <p:spPr>
-          <a:xfrm>
-            <a:off x="2342031" y="4123765"/>
-            <a:ext cx="282388" cy="295836"/>
-          </a:xfrm>
-          <a:prstGeom prst="ellipse">
-            <a:avLst/>
-          </a:prstGeom>
-          <a:solidFill>
-            <a:schemeClr val="tx1"/>
-          </a:solidFill>
-        </p:spPr>
-        <p:style>
-          <a:lnRef idx="1">
-            <a:schemeClr val="accent1"/>
-          </a:lnRef>
-          <a:fillRef idx="3">
-            <a:schemeClr val="accent1"/>
-          </a:fillRef>
-          <a:effectRef idx="2">
-            <a:schemeClr val="accent1"/>
-          </a:effectRef>
-          <a:fontRef idx="minor">
-            <a:schemeClr val="lt1"/>
-          </a:fontRef>
-        </p:style>
-        <p:txBody>
-          <a:bodyPr rtlCol="0" anchor="ctr"/>
-          <a:lstStyle/>
-          <a:p>
-            <a:pPr algn="ctr"/>
-            <a:endParaRPr lang="en-US"/>
-          </a:p>
-        </p:txBody>
-      </p:sp>
-      <p:sp>
-        <p:nvSpPr>
-          <p:cNvPr id="16" name="Oval 15"/>
-          <p:cNvSpPr/>
-          <p:nvPr/>
-        </p:nvSpPr>
-        <p:spPr>
-          <a:xfrm>
-            <a:off x="2624420" y="4419602"/>
-            <a:ext cx="282388" cy="295836"/>
-          </a:xfrm>
-          <a:prstGeom prst="ellipse">
-            <a:avLst/>
-          </a:prstGeom>
-          <a:solidFill>
-            <a:schemeClr val="tx1"/>
-          </a:solidFill>
-        </p:spPr>
-        <p:style>
-          <a:lnRef idx="1">
-            <a:schemeClr val="accent1"/>
-          </a:lnRef>
-          <a:fillRef idx="3">
-            <a:schemeClr val="accent1"/>
-          </a:fillRef>
-          <a:effectRef idx="2">
-            <a:schemeClr val="accent1"/>
-          </a:effectRef>
-          <a:fontRef idx="minor">
-            <a:schemeClr val="lt1"/>
-          </a:fontRef>
-        </p:style>
-        <p:txBody>
-          <a:bodyPr rtlCol="0" anchor="ctr"/>
-          <a:lstStyle/>
-          <a:p>
-            <a:pPr algn="ctr"/>
-            <a:endParaRPr lang="en-US"/>
-          </a:p>
-        </p:txBody>
-      </p:sp>
-      <p:sp>
-        <p:nvSpPr>
-          <p:cNvPr id="22" name="Oval 21"/>
-          <p:cNvSpPr/>
-          <p:nvPr/>
-        </p:nvSpPr>
-        <p:spPr>
-          <a:xfrm>
-            <a:off x="5311588" y="2514599"/>
-            <a:ext cx="282388" cy="295836"/>
-          </a:xfrm>
-          <a:prstGeom prst="ellipse">
-            <a:avLst/>
-          </a:prstGeom>
-          <a:solidFill>
-            <a:schemeClr val="tx1"/>
-          </a:solidFill>
-        </p:spPr>
-        <p:style>
-          <a:lnRef idx="1">
-            <a:schemeClr val="accent1"/>
-          </a:lnRef>
-          <a:fillRef idx="3">
-            <a:schemeClr val="accent1"/>
-          </a:fillRef>
-          <a:effectRef idx="2">
-            <a:schemeClr val="accent1"/>
-          </a:effectRef>
-          <a:fontRef idx="minor">
-            <a:schemeClr val="lt1"/>
-          </a:fontRef>
-        </p:style>
-        <p:txBody>
-          <a:bodyPr rtlCol="0" anchor="ctr"/>
-          <a:lstStyle/>
-          <a:p>
-            <a:pPr algn="ctr"/>
-            <a:endParaRPr lang="en-US"/>
-          </a:p>
-        </p:txBody>
-      </p:sp>
-      <p:sp>
-        <p:nvSpPr>
-          <p:cNvPr id="23" name="Oval 22"/>
-          <p:cNvSpPr/>
-          <p:nvPr/>
-        </p:nvSpPr>
-        <p:spPr>
-          <a:xfrm>
-            <a:off x="5320553" y="2900083"/>
-            <a:ext cx="282388" cy="295836"/>
-          </a:xfrm>
-          <a:prstGeom prst="ellipse">
-            <a:avLst/>
-          </a:prstGeom>
-          <a:solidFill>
-            <a:schemeClr val="tx1"/>
-          </a:solidFill>
-        </p:spPr>
-        <p:style>
-          <a:lnRef idx="1">
-            <a:schemeClr val="accent1"/>
-          </a:lnRef>
-          <a:fillRef idx="3">
-            <a:schemeClr val="accent1"/>
-          </a:fillRef>
-          <a:effectRef idx="2">
-            <a:schemeClr val="accent1"/>
-          </a:effectRef>
-          <a:fontRef idx="minor">
-            <a:schemeClr val="lt1"/>
-          </a:fontRef>
-        </p:style>
-        <p:txBody>
-          <a:bodyPr rtlCol="0" anchor="ctr"/>
-          <a:lstStyle/>
-          <a:p>
-            <a:pPr algn="ctr"/>
-            <a:endParaRPr lang="en-US"/>
-          </a:p>
-        </p:txBody>
-      </p:sp>
-      <p:sp>
-        <p:nvSpPr>
-          <p:cNvPr id="24" name="Oval 23"/>
-          <p:cNvSpPr/>
-          <p:nvPr/>
-        </p:nvSpPr>
-        <p:spPr>
-          <a:xfrm>
-            <a:off x="4713194" y="3975848"/>
-            <a:ext cx="282388" cy="295836"/>
-          </a:xfrm>
-          <a:prstGeom prst="ellipse">
-            <a:avLst/>
-          </a:prstGeom>
-          <a:solidFill>
-            <a:schemeClr val="tx1"/>
-          </a:solidFill>
-        </p:spPr>
-        <p:style>
-          <a:lnRef idx="1">
-            <a:schemeClr val="accent1"/>
-          </a:lnRef>
-          <a:fillRef idx="3">
-            <a:schemeClr val="accent1"/>
-          </a:fillRef>
-          <a:effectRef idx="2">
-            <a:schemeClr val="accent1"/>
-          </a:effectRef>
-          <a:fontRef idx="minor">
-            <a:schemeClr val="lt1"/>
-          </a:fontRef>
-        </p:style>
-        <p:txBody>
-          <a:bodyPr rtlCol="0" anchor="ctr"/>
-          <a:lstStyle/>
-          <a:p>
-            <a:pPr algn="ctr"/>
-            <a:endParaRPr lang="en-US"/>
-          </a:p>
-        </p:txBody>
-      </p:sp>
-      <p:sp>
-        <p:nvSpPr>
-          <p:cNvPr id="25" name="Oval 24"/>
-          <p:cNvSpPr/>
-          <p:nvPr/>
-        </p:nvSpPr>
-        <p:spPr>
-          <a:xfrm>
-            <a:off x="4430806" y="4271684"/>
-            <a:ext cx="282388" cy="295836"/>
-          </a:xfrm>
-          <a:prstGeom prst="ellipse">
-            <a:avLst/>
-          </a:prstGeom>
-          <a:solidFill>
-            <a:schemeClr val="tx1"/>
-          </a:solidFill>
-        </p:spPr>
-        <p:style>
-          <a:lnRef idx="1">
-            <a:schemeClr val="accent1"/>
-          </a:lnRef>
-          <a:fillRef idx="3">
-            <a:schemeClr val="accent1"/>
-          </a:fillRef>
-          <a:effectRef idx="2">
-            <a:schemeClr val="accent1"/>
-          </a:effectRef>
-          <a:fontRef idx="minor">
-            <a:schemeClr val="lt1"/>
-          </a:fontRef>
-        </p:style>
-        <p:txBody>
-          <a:bodyPr rtlCol="0" anchor="ctr"/>
-          <a:lstStyle/>
-          <a:p>
-            <a:pPr algn="ctr"/>
-            <a:endParaRPr lang="en-US"/>
-          </a:p>
-        </p:txBody>
-      </p:sp>
-    </p:spTree>
-    <p:extLst>
-      <p:ext uri="{BB962C8B-B14F-4D97-AF65-F5344CB8AC3E}">
-        <p14:creationId xmlns:p14="http://schemas.microsoft.com/office/powerpoint/2010/main" val="4172607115"/>
-      </p:ext>
-    </p:extLst>
-  </p:cSld>
-  <p:clrMapOvr>
-    <a:masterClrMapping/>
-  </p:clrMapOvr>
-</p:sld>
-</file>
-
-<file path=ppt/slides/slide14.xml><?xml version="1.0" encoding="utf-8"?>
-<p:sld xmlns:a="http://schemas.openxmlformats.org/drawingml/2006/main" xmlns:r="http://schemas.openxmlformats.org/officeDocument/2006/relationships" xmlns:p="http://schemas.openxmlformats.org/presentationml/2006/main">
-  <p:cSld>
-    <p:spTree>
-      <p:nvGrpSpPr>
-        <p:cNvPr id="1" name=""/>
-        <p:cNvGrpSpPr/>
-        <p:nvPr/>
-      </p:nvGrpSpPr>
-      <p:grpSpPr>
-        <a:xfrm>
-          <a:off x="0" y="0"/>
-          <a:ext cx="0" cy="0"/>
-          <a:chOff x="0" y="0"/>
-          <a:chExt cx="0" cy="0"/>
-        </a:xfrm>
-      </p:grpSpPr>
-      <p:sp>
-        <p:nvSpPr>
-          <p:cNvPr id="4" name="Title 3"/>
-          <p:cNvSpPr>
-            <a:spLocks noGrp="1"/>
-          </p:cNvSpPr>
-          <p:nvPr>
-            <p:ph type="title"/>
-          </p:nvPr>
-        </p:nvSpPr>
-        <p:spPr/>
-        <p:txBody>
-          <a:bodyPr>
-            <a:normAutofit/>
-          </a:bodyPr>
-          <a:lstStyle/>
-          <a:p>
-            <a:r>
-              <a:rPr lang="en-US" dirty="0"/>
-              <a:t>Mechanics of Testing</a:t>
-            </a:r>
-          </a:p>
-        </p:txBody>
-      </p:sp>
-      <p:sp>
-        <p:nvSpPr>
-          <p:cNvPr id="3" name="Content Placeholder 2"/>
-          <p:cNvSpPr>
-            <a:spLocks noGrp="1"/>
-          </p:cNvSpPr>
-          <p:nvPr>
-            <p:ph idx="1"/>
-          </p:nvPr>
-        </p:nvSpPr>
-        <p:spPr/>
-        <p:txBody>
-          <a:bodyPr>
-            <a:normAutofit fontScale="85000" lnSpcReduction="20000"/>
-          </a:bodyPr>
-          <a:lstStyle/>
-          <a:p>
-            <a:r>
-              <a:rPr lang="en-US" dirty="0"/>
-              <a:t>We will give you a file called </a:t>
-            </a:r>
-            <a:r>
-              <a:rPr lang="en-US" b="1" dirty="0" err="1">
-                <a:hlinkClick r:id="rId3" action="ppaction://hlinkfile"/>
-              </a:rPr>
-              <a:t>extras.rkt</a:t>
-            </a:r>
-            <a:r>
-              <a:rPr lang="en-US" dirty="0"/>
-              <a:t> that you should put in the folder with your work.</a:t>
-            </a:r>
-          </a:p>
-          <a:p>
-            <a:r>
-              <a:rPr lang="en-US" dirty="0"/>
-              <a:t>Near the top of your file, write</a:t>
-            </a:r>
-          </a:p>
-          <a:p>
-            <a:pPr marL="400050" lvl="1" indent="0">
-              <a:buNone/>
-            </a:pPr>
-            <a:r>
-              <a:rPr lang="en-US" sz="2400" b="1" dirty="0">
-                <a:latin typeface="Consolas" pitchFamily="49" charset="0"/>
-                <a:cs typeface="Consolas" pitchFamily="49" charset="0"/>
-              </a:rPr>
-              <a:t>(require </a:t>
-            </a:r>
-            <a:r>
-              <a:rPr lang="en-US" sz="2400" b="1" dirty="0" err="1">
-                <a:latin typeface="Consolas" pitchFamily="49" charset="0"/>
-                <a:cs typeface="Consolas" pitchFamily="49" charset="0"/>
-              </a:rPr>
-              <a:t>rackunit</a:t>
-            </a:r>
-            <a:r>
-              <a:rPr lang="en-US" sz="2400" b="1" dirty="0">
-                <a:latin typeface="Consolas" pitchFamily="49" charset="0"/>
-                <a:cs typeface="Consolas" pitchFamily="49" charset="0"/>
-              </a:rPr>
-              <a:t>) </a:t>
-            </a:r>
-          </a:p>
-          <a:p>
-            <a:pPr marL="400050" lvl="1" indent="0">
-              <a:buNone/>
-            </a:pPr>
-            <a:r>
-              <a:rPr lang="en-US" sz="2400" b="1" dirty="0">
-                <a:latin typeface="Consolas" pitchFamily="49" charset="0"/>
-                <a:cs typeface="Consolas" pitchFamily="49" charset="0"/>
-              </a:rPr>
-              <a:t>(require "</a:t>
-            </a:r>
-            <a:r>
-              <a:rPr lang="en-US" sz="2400" b="1" dirty="0" err="1">
-                <a:latin typeface="Consolas" pitchFamily="49" charset="0"/>
-                <a:cs typeface="Consolas" pitchFamily="49" charset="0"/>
-              </a:rPr>
-              <a:t>extras.rkt</a:t>
-            </a:r>
-            <a:r>
-              <a:rPr lang="en-US" sz="2400" b="1" dirty="0">
-                <a:latin typeface="Consolas" pitchFamily="49" charset="0"/>
-                <a:cs typeface="Consolas" pitchFamily="49" charset="0"/>
-              </a:rPr>
-              <a:t>")</a:t>
-            </a:r>
-          </a:p>
-          <a:p>
-            <a:pPr marL="0" indent="0">
-              <a:buNone/>
-            </a:pPr>
-            <a:r>
-              <a:rPr lang="en-US" dirty="0">
-                <a:cs typeface="Consolas" pitchFamily="49" charset="0"/>
-              </a:rPr>
-              <a:t>   to load our testing framework.</a:t>
-            </a:r>
-          </a:p>
-          <a:p>
-            <a:r>
-              <a:rPr lang="en-US" dirty="0"/>
-              <a:t>Tests live in the file with the code </a:t>
-            </a:r>
-          </a:p>
-          <a:p>
-            <a:r>
-              <a:rPr lang="en-US" dirty="0"/>
-              <a:t>That way they get run every time the code is loaded</a:t>
-            </a:r>
-          </a:p>
-          <a:p>
-            <a:pPr lvl="1"/>
-            <a:r>
-              <a:rPr lang="en-US" dirty="0"/>
-              <a:t>This accomplishes regression testing.</a:t>
-            </a:r>
-          </a:p>
-          <a:p>
-            <a:r>
-              <a:rPr lang="en-US" dirty="0"/>
-              <a:t>Wrap your tests in </a:t>
-            </a:r>
-            <a:r>
-              <a:rPr lang="en-US" sz="2800" b="1" dirty="0">
-                <a:latin typeface="Consolas" panose="020B0609020204030204" pitchFamily="49" charset="0"/>
-                <a:cs typeface="Consolas" panose="020B0609020204030204" pitchFamily="49" charset="0"/>
-              </a:rPr>
-              <a:t>(begin-for-test ....)</a:t>
-            </a:r>
-          </a:p>
-          <a:p>
-            <a:pPr lvl="1"/>
-            <a:r>
-              <a:rPr lang="en-US" dirty="0"/>
-              <a:t>that way you can put the tests anywhere in your file, and they will be run at the end of the file</a:t>
-            </a:r>
-          </a:p>
-          <a:p>
-            <a:pPr marL="0" indent="0">
-              <a:buNone/>
-            </a:pPr>
-            <a:endParaRPr lang="en-US" sz="2400" b="1" dirty="0">
-              <a:latin typeface="Consolas" pitchFamily="49" charset="0"/>
-              <a:cs typeface="Consolas" pitchFamily="49" charset="0"/>
-            </a:endParaRPr>
-          </a:p>
-        </p:txBody>
-      </p:sp>
-      <p:sp>
-        <p:nvSpPr>
-          <p:cNvPr id="2" name="Slide Number Placeholder 1"/>
-          <p:cNvSpPr>
-            <a:spLocks noGrp="1"/>
-          </p:cNvSpPr>
-          <p:nvPr>
-            <p:ph type="sldNum" sz="quarter" idx="12"/>
-          </p:nvPr>
-        </p:nvSpPr>
-        <p:spPr/>
-        <p:txBody>
-          <a:bodyPr/>
-          <a:lstStyle/>
-          <a:p>
-            <a:fld id="{B6F15528-21DE-4FAA-801E-634DDDAF4B2B}" type="slidenum">
-              <a:rPr lang="en-US" smtClean="0"/>
-              <a:pPr/>
-              <a:t>14</a:t>
-            </a:fld>
-            <a:endParaRPr lang="en-US"/>
-          </a:p>
-        </p:txBody>
-      </p:sp>
-    </p:spTree>
-    <p:extLst>
-      <p:ext uri="{BB962C8B-B14F-4D97-AF65-F5344CB8AC3E}">
-        <p14:creationId xmlns:p14="http://schemas.microsoft.com/office/powerpoint/2010/main" val="3804961615"/>
-      </p:ext>
-    </p:extLst>
-  </p:cSld>
-  <p:clrMapOvr>
-    <a:masterClrMapping/>
-  </p:clrMapOvr>
-</p:sld>
-</file>
-
 <file path=ppt/slides/slide15.xml><?xml version="1.0" encoding="utf-8"?>
 <p:sld xmlns:a="http://schemas.openxmlformats.org/drawingml/2006/main" xmlns:r="http://schemas.openxmlformats.org/officeDocument/2006/relationships" xmlns:p="http://schemas.openxmlformats.org/presentationml/2006/main">
   <p:cSld>
@@ -7561,14 +6724,10 @@
         </p:nvSpPr>
         <p:spPr/>
         <p:txBody>
-          <a:bodyPr/>
-          <a:lstStyle/>
-          <a:p>
-            <a:r>
-              <a:rPr lang="en-US" dirty="0"/>
-              <a:t>We’ll concentrate on the equivalence partitioning.</a:t>
-            </a:r>
-          </a:p>
+          <a:bodyPr>
+            <a:normAutofit lnSpcReduction="10000"/>
+          </a:bodyPr>
+          <a:lstStyle/>
           <a:p>
             <a:r>
               <a:rPr lang="en-US" dirty="0"/>
@@ -7578,7 +6737,13 @@
           <a:p>
             <a:r>
               <a:rPr lang="en-US" dirty="0"/>
-              <a:t>Then give mnemonic names to the input and output values in each partition.  You can put these definitions with your data definitions, so you can use the names in your examples.</a:t>
+              <a:t>Pick some input and output values for each partition.  Give mnemonic names to each of them.  You can put these definitions with your data definitions, so you can use the names in your examples.</a:t>
+            </a:r>
+          </a:p>
+          <a:p>
+            <a:r>
+              <a:rPr lang="en-US" dirty="0"/>
+              <a:t>Then write your tests using the mnemonic names.</a:t>
             </a:r>
           </a:p>
         </p:txBody>
@@ -8668,42 +7833,25 @@
           <a:p>
             <a:r>
               <a:rPr lang="en-US" dirty="0"/>
-              <a:t>This lesson covers testing in more detail</a:t>
-            </a:r>
-          </a:p>
-          <a:p>
-            <a:r>
-              <a:rPr lang="en-US" dirty="0"/>
-              <a:t>We will learn about</a:t>
-            </a:r>
-          </a:p>
-          <a:p>
-            <a:pPr lvl="1"/>
-            <a:r>
-              <a:rPr lang="en-US" dirty="0"/>
-              <a:t>different kinds of testing</a:t>
-            </a:r>
-          </a:p>
-          <a:p>
-            <a:pPr lvl="1"/>
-            <a:r>
-              <a:rPr lang="en-US" dirty="0"/>
-              <a:t>the </a:t>
-            </a:r>
-            <a:r>
-              <a:rPr lang="en-US" dirty="0" err="1"/>
-              <a:t>rackunit</a:t>
-            </a:r>
-            <a:r>
-              <a:rPr lang="en-US" dirty="0"/>
-              <a:t> test framework that we will use in this course</a:t>
-            </a:r>
-          </a:p>
-          <a:p>
-            <a:pPr lvl="1"/>
-            <a:r>
-              <a:rPr lang="en-US" dirty="0"/>
-              <a:t>how to use testing to help in debugging.</a:t>
+              <a:t>What do we test?</a:t>
+            </a:r>
+          </a:p>
+          <a:p>
+            <a:r>
+              <a:rPr lang="en-US" dirty="0"/>
+              <a:t>How do we test them?</a:t>
+            </a:r>
+          </a:p>
+          <a:p>
+            <a:r>
+              <a:rPr lang="en-US" dirty="0"/>
+              <a:t>How do we choose and write test cases?</a:t>
+            </a:r>
+          </a:p>
+          <a:p>
+            <a:r>
+              <a:rPr lang="en-US" dirty="0"/>
+              <a:t>How do we go about debugging using tests?</a:t>
             </a:r>
           </a:p>
         </p:txBody>
@@ -8829,7 +7977,7 @@
             <a:pPr lvl="1"/>
             <a:r>
               <a:rPr lang="en-US" dirty="0"/>
-              <a:t>will see how to do this later</a:t>
+              <a:t>use property testing to handle this situation.</a:t>
             </a:r>
           </a:p>
         </p:txBody>
@@ -9448,7 +8596,7 @@
           <a:p>
             <a:r>
               <a:rPr lang="en-US" dirty="0"/>
-              <a:t>Once you’ve written the deliverables for the 6 steps of the design recipe, it’s time to run the program.</a:t>
+              <a:t>Once you’ve written the deliverables for the first five steps of the design recipe, it’s time to run the program. (Program Review will come later)</a:t>
             </a:r>
           </a:p>
           <a:p>
@@ -9770,13 +8918,9 @@
             </a:r>
           </a:p>
           <a:p>
-            <a:pPr lvl="2"/>
-            <a:r>
-              <a:rPr lang="en-US" dirty="0"/>
-              <a:t>We’ll see how to do this in a minute.</a:t>
-            </a:r>
-          </a:p>
-          <a:p>
+            <a:pPr marL="0" indent="0">
+              <a:buNone/>
+            </a:pPr>
             <a:endParaRPr lang="en-US" dirty="0"/>
           </a:p>
         </p:txBody>
@@ -9847,7 +8991,9 @@
         </p:nvSpPr>
         <p:spPr/>
         <p:txBody>
-          <a:bodyPr/>
+          <a:bodyPr>
+            <a:normAutofit/>
+          </a:bodyPr>
           <a:lstStyle/>
           <a:p>
             <a:r>
@@ -9870,7 +9016,7 @@
         <p:spPr/>
         <p:txBody>
           <a:bodyPr>
-            <a:normAutofit fontScale="85000" lnSpcReduction="10000"/>
+            <a:normAutofit fontScale="77500" lnSpcReduction="20000"/>
           </a:bodyPr>
           <a:lstStyle/>
           <a:p>
@@ -9934,21 +9080,35 @@
             <a:pPr lvl="2"/>
             <a:r>
               <a:rPr lang="en-US" dirty="0"/>
-              <a:t>Did your function call the right helper?</a:t>
+              <a:t>Add a test to see if your function called the right helper?</a:t>
             </a:r>
           </a:p>
           <a:p>
             <a:pPr lvl="3"/>
             <a:r>
               <a:rPr lang="en-US" dirty="0"/>
-              <a:t>yes: test the helper</a:t>
+              <a:t>yes: the helper is the one giving the wrong answer.  Test the helper and fix it.</a:t>
             </a:r>
           </a:p>
           <a:p>
             <a:pPr lvl="3"/>
             <a:r>
               <a:rPr lang="en-US" dirty="0"/>
-              <a:t>no: test the predicate</a:t>
+              <a:t>no: your original function didn’t call the helper as it should.  </a:t>
+            </a:r>
+          </a:p>
+          <a:p>
+            <a:pPr lvl="4"/>
+            <a:r>
+              <a:rPr lang="en-US" dirty="0"/>
+              <a:t>The call to the helper is probably guarded by a predicate.  Test the predicate to see if it is returning the right value. </a:t>
+            </a:r>
+          </a:p>
+          <a:p>
+            <a:pPr lvl="4"/>
+            <a:r>
+              <a:rPr lang="en-US" dirty="0"/>
+              <a:t>Did it pass the right arguments?  Write some more tests to see.</a:t>
             </a:r>
           </a:p>
         </p:txBody>
@@ -10026,7 +9186,7 @@
           <a:p>
             <a:r>
               <a:rPr lang="en-US" dirty="0"/>
-              <a:t>Example: Debugging by Testing</a:t>
+              <a:t>Debugging by Testing: Example</a:t>
             </a:r>
           </a:p>
         </p:txBody>
@@ -10939,7 +10099,14 @@
             <a:pPr lvl="1"/>
             <a:r>
               <a:rPr lang="en-US" dirty="0"/>
-              <a:t>list and explain four different testing goals and two different kinds of testing.</a:t>
+              <a:t>examine a test and see what it is testing for</a:t>
+            </a:r>
+          </a:p>
+          <a:p>
+            <a:pPr lvl="1"/>
+            <a:r>
+              <a:rPr lang="en-US" dirty="0"/>
+              <a:t>use the concept of equivalence classes to get 100% expression coverage</a:t>
             </a:r>
           </a:p>
           <a:p>
@@ -11359,28 +10526,6 @@
         </p:nvSpPr>
         <p:spPr/>
         <p:txBody>
-          <a:bodyPr/>
-          <a:lstStyle/>
-          <a:p>
-            <a:r>
-              <a:rPr lang="en-US" dirty="0"/>
-              <a:t>What else could have gone wrong?</a:t>
-            </a:r>
-          </a:p>
-        </p:txBody>
-      </p:sp>
-      <p:sp>
-        <p:nvSpPr>
-          <p:cNvPr id="3" name="Content Placeholder 2"/>
-          <p:cNvSpPr>
-            <a:spLocks noGrp="1"/>
-          </p:cNvSpPr>
-          <p:nvPr>
-            <p:ph idx="1"/>
-          </p:nvPr>
-        </p:nvSpPr>
-        <p:spPr/>
-        <p:txBody>
           <a:bodyPr>
             <a:normAutofit/>
           </a:bodyPr>
@@ -11388,13 +10533,35 @@
           <a:p>
             <a:r>
               <a:rPr lang="en-US" dirty="0"/>
-              <a:t>You could have called your help function with the wrong arguments.</a:t>
-            </a:r>
-          </a:p>
-          <a:p>
-            <a:r>
-              <a:rPr lang="en-US" dirty="0"/>
-              <a:t>You can use the same techniques to identify this.</a:t>
+              <a:t>Keep your bug from re-appearing</a:t>
+            </a:r>
+          </a:p>
+        </p:txBody>
+      </p:sp>
+      <p:sp>
+        <p:nvSpPr>
+          <p:cNvPr id="3" name="Content Placeholder 2"/>
+          <p:cNvSpPr>
+            <a:spLocks noGrp="1"/>
+          </p:cNvSpPr>
+          <p:nvPr>
+            <p:ph idx="1"/>
+          </p:nvPr>
+        </p:nvSpPr>
+        <p:spPr/>
+        <p:txBody>
+          <a:bodyPr/>
+          <a:lstStyle/>
+          <a:p>
+            <a:r>
+              <a:rPr lang="en-US" dirty="0"/>
+              <a:t>Leave the extra tests in your file</a:t>
+            </a:r>
+          </a:p>
+          <a:p>
+            <a:r>
+              <a:rPr lang="en-US" dirty="0"/>
+              <a:t>That way if your bug reappears you will have the detective work all set up.</a:t>
             </a:r>
           </a:p>
         </p:txBody>
@@ -11426,7 +10593,7 @@
     </p:spTree>
     <p:extLst>
       <p:ext uri="{BB962C8B-B14F-4D97-AF65-F5344CB8AC3E}">
-        <p14:creationId xmlns:p14="http://schemas.microsoft.com/office/powerpoint/2010/main" val="2609706510"/>
+        <p14:creationId xmlns:p14="http://schemas.microsoft.com/office/powerpoint/2010/main" val="582737510"/>
       </p:ext>
     </p:extLst>
   </p:cSld>
@@ -11465,43 +10632,52 @@
         </p:nvSpPr>
         <p:spPr/>
         <p:txBody>
+          <a:bodyPr/>
+          <a:lstStyle/>
+          <a:p>
+            <a:r>
+              <a:rPr lang="en-US" dirty="0"/>
+              <a:t>Disclaimer</a:t>
+            </a:r>
+          </a:p>
+        </p:txBody>
+      </p:sp>
+      <p:sp>
+        <p:nvSpPr>
+          <p:cNvPr id="3" name="Content Placeholder 2"/>
+          <p:cNvSpPr>
+            <a:spLocks noGrp="1"/>
+          </p:cNvSpPr>
+          <p:nvPr>
+            <p:ph idx="1"/>
+          </p:nvPr>
+        </p:nvSpPr>
+        <p:spPr/>
+        <p:txBody>
           <a:bodyPr>
-            <a:normAutofit/>
+            <a:normAutofit lnSpcReduction="10000"/>
           </a:bodyPr>
           <a:lstStyle/>
           <a:p>
             <a:r>
               <a:rPr lang="en-US" dirty="0"/>
-              <a:t>Keep your bug from re-appearing</a:t>
-            </a:r>
-          </a:p>
-        </p:txBody>
-      </p:sp>
-      <p:sp>
-        <p:nvSpPr>
-          <p:cNvPr id="3" name="Content Placeholder 2"/>
-          <p:cNvSpPr>
-            <a:spLocks noGrp="1"/>
-          </p:cNvSpPr>
-          <p:nvPr>
-            <p:ph idx="1"/>
-          </p:nvPr>
-        </p:nvSpPr>
-        <p:spPr/>
-        <p:txBody>
-          <a:bodyPr/>
-          <a:lstStyle/>
-          <a:p>
-            <a:r>
-              <a:rPr lang="en-US" dirty="0"/>
-              <a:t>Leave the extra tests in your file</a:t>
-            </a:r>
-          </a:p>
-          <a:p>
-            <a:r>
-              <a:rPr lang="en-US" dirty="0"/>
-              <a:t>That way if your bug reappears you will have the detective work all set up.</a:t>
-            </a:r>
+              <a:t>Our presentation has been specific to Racket and to this course, but the ideas and techniques are adaptable to other settings and other languages.</a:t>
+            </a:r>
+          </a:p>
+          <a:p>
+            <a:r>
+              <a:rPr lang="en-US" dirty="0"/>
+              <a:t>Your employer may have different conventions for managing tests.  </a:t>
+            </a:r>
+          </a:p>
+          <a:p>
+            <a:r>
+              <a:rPr lang="en-US" dirty="0"/>
+              <a:t>If your employer does not have conventions for systematic testing, you should urge him (or her) to introduce one.</a:t>
+            </a:r>
+          </a:p>
+          <a:p>
+            <a:endParaRPr lang="en-US" dirty="0"/>
           </a:p>
         </p:txBody>
       </p:sp>
@@ -11532,7 +10708,7 @@
     </p:spTree>
     <p:extLst>
       <p:ext uri="{BB962C8B-B14F-4D97-AF65-F5344CB8AC3E}">
-        <p14:creationId xmlns:p14="http://schemas.microsoft.com/office/powerpoint/2010/main" val="582737510"/>
+        <p14:creationId xmlns:p14="http://schemas.microsoft.com/office/powerpoint/2010/main" val="1885062638"/>
       </p:ext>
     </p:extLst>
   </p:cSld>
@@ -11576,7 +10752,7 @@
           <a:p>
             <a:r>
               <a:rPr lang="en-US" dirty="0"/>
-              <a:t>Disclaimer</a:t>
+              <a:t>Learning Objectives</a:t>
             </a:r>
           </a:p>
         </p:txBody>
@@ -11593,30 +10769,57 @@
         </p:nvSpPr>
         <p:spPr/>
         <p:txBody>
-          <a:bodyPr>
-            <a:normAutofit lnSpcReduction="10000"/>
-          </a:bodyPr>
-          <a:lstStyle/>
-          <a:p>
-            <a:r>
-              <a:rPr lang="en-US" dirty="0"/>
-              <a:t>Our presentation has been specific to Racket and to this course, but the ideas and techniques are adaptable to other settings and other languages.</a:t>
-            </a:r>
-          </a:p>
-          <a:p>
-            <a:r>
-              <a:rPr lang="en-US" dirty="0"/>
-              <a:t>Your employer may have different conventions for managing tests.  </a:t>
-            </a:r>
-          </a:p>
-          <a:p>
-            <a:r>
-              <a:rPr lang="en-US" dirty="0"/>
-              <a:t>If your employer does not have conventions for systematic testing, you should urge him (or her) to introduce one.</a:t>
-            </a:r>
-          </a:p>
-          <a:p>
-            <a:endParaRPr lang="en-US" dirty="0"/>
+          <a:bodyPr/>
+          <a:lstStyle/>
+          <a:p>
+            <a:r>
+              <a:rPr lang="en-US" dirty="0"/>
+              <a:t>At the end of this lesson, the student should be able to:</a:t>
+            </a:r>
+          </a:p>
+          <a:p>
+            <a:pPr lvl="1"/>
+            <a:r>
+              <a:rPr lang="en-US" dirty="0"/>
+              <a:t>examine a test and see what it is testing for</a:t>
+            </a:r>
+          </a:p>
+          <a:p>
+            <a:pPr lvl="1"/>
+            <a:r>
+              <a:rPr lang="en-US" dirty="0"/>
+              <a:t>use the concept of equivalence classes to get 100% expression coverage</a:t>
+            </a:r>
+          </a:p>
+          <a:p>
+            <a:pPr lvl="1"/>
+            <a:r>
+              <a:rPr lang="en-US" dirty="0"/>
+              <a:t>use the </a:t>
+            </a:r>
+            <a:r>
+              <a:rPr lang="en-US" dirty="0" err="1"/>
+              <a:t>rackunit</a:t>
+            </a:r>
+            <a:r>
+              <a:rPr lang="en-US" dirty="0"/>
+              <a:t> framework to write test suites for simple programming problems</a:t>
+            </a:r>
+          </a:p>
+          <a:p>
+            <a:pPr lvl="1"/>
+            <a:r>
+              <a:rPr lang="en-US" dirty="0"/>
+              <a:t>use the </a:t>
+            </a:r>
+            <a:r>
+              <a:rPr lang="en-US" dirty="0" err="1"/>
+              <a:t>rackunit</a:t>
+            </a:r>
+            <a:r>
+              <a:rPr lang="en-US" dirty="0"/>
+              <a:t> framework to help in debugging simple programs</a:t>
+            </a:r>
           </a:p>
         </p:txBody>
       </p:sp>
@@ -11647,7 +10850,7 @@
     </p:spTree>
     <p:extLst>
       <p:ext uri="{BB962C8B-B14F-4D97-AF65-F5344CB8AC3E}">
-        <p14:creationId xmlns:p14="http://schemas.microsoft.com/office/powerpoint/2010/main" val="1885062638"/>
+        <p14:creationId xmlns:p14="http://schemas.microsoft.com/office/powerpoint/2010/main" val="1093670472"/>
       </p:ext>
     </p:extLst>
   </p:cSld>
@@ -11712,12 +10915,8 @@
           <a:lstStyle/>
           <a:p>
             <a:r>
-              <a:rPr lang="en-US"/>
-              <a:t>Study 02-6-ball-after-mouse-with-tests.rkt </a:t>
-            </a:r>
-            <a:r>
-              <a:rPr lang="en-US" dirty="0"/>
-              <a:t>.</a:t>
+              <a:rPr lang="en-US" dirty="0"/>
+              <a:t>Study 02-6-test-quadratics.rkt and 02-7-ball-after-mouse-with-tests.rkt .</a:t>
             </a:r>
           </a:p>
           <a:p>
@@ -11805,7 +11004,7 @@
           <a:p>
             <a:r>
               <a:rPr lang="en-US" dirty="0"/>
-              <a:t>Goals of Testing</a:t>
+              <a:t>What do we want to test?</a:t>
             </a:r>
           </a:p>
         </p:txBody>
@@ -11822,134 +11021,74 @@
         </p:nvSpPr>
         <p:spPr/>
         <p:txBody>
-          <a:bodyPr>
-            <a:normAutofit fontScale="85000" lnSpcReduction="20000"/>
-          </a:bodyPr>
-          <a:lstStyle/>
-          <a:p>
-            <a:r>
-              <a:rPr lang="en-US" i="1" dirty="0">
+          <a:bodyPr/>
+          <a:lstStyle/>
+          <a:p>
+            <a:r>
+              <a:rPr lang="en-US" dirty="0"/>
+              <a:t>Lots of things we could want to test, but for now we’ll keep it simple:</a:t>
+            </a:r>
+          </a:p>
+          <a:p>
+            <a:r>
+              <a:rPr lang="en-US" dirty="0"/>
+              <a:t>We want to make sure the answers from our functions are correct.</a:t>
+            </a:r>
+          </a:p>
+          <a:p>
+            <a:r>
+              <a:rPr lang="en-US" dirty="0"/>
+              <a:t>But what makes an answer correct?</a:t>
+            </a:r>
+          </a:p>
+          <a:p>
+            <a:r>
+              <a:rPr lang="en-US" dirty="0"/>
+              <a:t>And how do you convince a reader that your tests are testing the right thing?</a:t>
+            </a:r>
+          </a:p>
+        </p:txBody>
+      </p:sp>
+      <p:sp>
+        <p:nvSpPr>
+          <p:cNvPr id="4" name="Slide Number Placeholder 3"/>
+          <p:cNvSpPr>
+            <a:spLocks noGrp="1"/>
+          </p:cNvSpPr>
+          <p:nvPr>
+            <p:ph type="sldNum" sz="quarter" idx="12"/>
+          </p:nvPr>
+        </p:nvSpPr>
+        <p:spPr/>
+        <p:txBody>
+          <a:bodyPr/>
+          <a:lstStyle/>
+          <a:p>
+            <a:fld id="{2AF3B5EA-18B6-4040-9F78-6052AF49C681}" type="slidenum">
+              <a:rPr lang="en-US" smtClean="0">
                 <a:solidFill>
-                  <a:srgbClr val="FF0000"/>
+                  <a:prstClr val="black">
+                    <a:tint val="75000"/>
+                  </a:prstClr>
                 </a:solidFill>
               </a:rPr>
-              <a:t>Qualification Testing: </a:t>
-            </a:r>
-            <a:r>
-              <a:rPr lang="en-US" dirty="0"/>
-              <a:t>Make sure program is ready for more serious testing</a:t>
-            </a:r>
-            <a:endParaRPr lang="en-US" i="1" dirty="0">
-              <a:solidFill>
-                <a:srgbClr val="FF0000"/>
-              </a:solidFill>
-            </a:endParaRPr>
-          </a:p>
-          <a:p>
-            <a:r>
-              <a:rPr lang="en-US" i="1" dirty="0">
-                <a:solidFill>
-                  <a:srgbClr val="FF0000"/>
-                </a:solidFill>
-              </a:rPr>
-              <a:t>Acceptance Testing: </a:t>
-            </a:r>
-            <a:r>
-              <a:rPr lang="en-US" dirty="0"/>
-              <a:t>Make sure program works on the given examples or use cases</a:t>
-            </a:r>
-            <a:endParaRPr lang="en-US" i="1" dirty="0">
-              <a:solidFill>
-                <a:srgbClr val="FF0000"/>
-              </a:solidFill>
-            </a:endParaRPr>
-          </a:p>
-          <a:p>
-            <a:r>
-              <a:rPr lang="en-US" i="1" dirty="0">
-                <a:solidFill>
-                  <a:srgbClr val="FF0000"/>
-                </a:solidFill>
-              </a:rPr>
-              <a:t>Requirements Testing</a:t>
-            </a:r>
-            <a:r>
-              <a:rPr lang="en-US" dirty="0"/>
-              <a:t>: Make sure program works as intended on other examples</a:t>
-            </a:r>
-          </a:p>
-          <a:p>
-            <a:r>
-              <a:rPr lang="en-US" i="1" dirty="0">
-                <a:solidFill>
-                  <a:srgbClr val="FF0000"/>
-                </a:solidFill>
-              </a:rPr>
-              <a:t>Regression Testing</a:t>
-            </a:r>
-            <a:r>
-              <a:rPr lang="en-US" dirty="0"/>
-              <a:t>: Make sure that a change hasn’t broken anything.</a:t>
-            </a:r>
-          </a:p>
-          <a:p>
-            <a:r>
-              <a:rPr lang="en-US" i="1" dirty="0">
-                <a:solidFill>
-                  <a:srgbClr val="FF0000"/>
-                </a:solidFill>
-              </a:rPr>
-              <a:t>Stress Testing</a:t>
-            </a:r>
-            <a:r>
-              <a:rPr lang="en-US" dirty="0"/>
-              <a:t>: How does the program perform for large inputs, heavy loads, etc.?</a:t>
-            </a:r>
-          </a:p>
-          <a:p>
-            <a:r>
-              <a:rPr lang="en-US" i="1" dirty="0">
-                <a:solidFill>
-                  <a:srgbClr val="FF0000"/>
-                </a:solidFill>
-              </a:rPr>
-              <a:t>Usability Testing</a:t>
-            </a:r>
-            <a:r>
-              <a:rPr lang="en-US" dirty="0"/>
-              <a:t>: Is the program usable by its intended audience?</a:t>
-            </a:r>
-          </a:p>
-        </p:txBody>
-      </p:sp>
-      <p:sp>
-        <p:nvSpPr>
-          <p:cNvPr id="4" name="Slide Number Placeholder 3"/>
-          <p:cNvSpPr>
-            <a:spLocks noGrp="1"/>
-          </p:cNvSpPr>
-          <p:nvPr>
-            <p:ph type="sldNum" sz="quarter" idx="12"/>
-          </p:nvPr>
-        </p:nvSpPr>
-        <p:spPr/>
-        <p:txBody>
-          <a:bodyPr/>
-          <a:lstStyle/>
-          <a:p>
-            <a:fld id="{B6F15528-21DE-4FAA-801E-634DDDAF4B2B}" type="slidenum">
-              <a:rPr lang="en-US" smtClean="0"/>
               <a:pPr/>
               <a:t>4</a:t>
             </a:fld>
-            <a:endParaRPr lang="en-US"/>
+            <a:endParaRPr lang="en-US">
+              <a:solidFill>
+                <a:prstClr val="black">
+                  <a:tint val="75000"/>
+                </a:prstClr>
+              </a:solidFill>
+            </a:endParaRPr>
           </a:p>
         </p:txBody>
       </p:sp>
     </p:spTree>
     <p:extLst>
       <p:ext uri="{BB962C8B-B14F-4D97-AF65-F5344CB8AC3E}">
-        <p14:creationId xmlns:p14="http://schemas.microsoft.com/office/powerpoint/2010/main" val="1590780086"/>
+        <p14:creationId xmlns:p14="http://schemas.microsoft.com/office/powerpoint/2010/main" val="2933201502"/>
       </p:ext>
     </p:extLst>
   </p:cSld>
@@ -12137,6 +11276,12 @@
               <a:t>Sometimes the requirements are more complicated, so you'll have to make up examples to check the requirements.</a:t>
             </a:r>
           </a:p>
+          <a:p>
+            <a:r>
+              <a:rPr lang="en-US" dirty="0"/>
+              <a:t>This is our primary focus</a:t>
+            </a:r>
+          </a:p>
         </p:txBody>
       </p:sp>
       <p:sp>
@@ -12160,79 +11305,6 @@
               <a:t>6</a:t>
             </a:fld>
             <a:endParaRPr lang="en-US"/>
-          </a:p>
-        </p:txBody>
-      </p:sp>
-      <p:sp>
-        <p:nvSpPr>
-          <p:cNvPr id="5" name="Rectangle 4"/>
-          <p:cNvSpPr/>
-          <p:nvPr/>
-        </p:nvSpPr>
-        <p:spPr>
-          <a:xfrm>
-            <a:off x="2209800" y="4495800"/>
-            <a:ext cx="4648200" cy="1752600"/>
-          </a:xfrm>
-          <a:prstGeom prst="rect">
-            <a:avLst/>
-          </a:prstGeom>
-          <a:solidFill>
-            <a:schemeClr val="accent3">
-              <a:lumMod val="40000"/>
-              <a:lumOff val="60000"/>
-            </a:schemeClr>
-          </a:solidFill>
-          <a:ln/>
-        </p:spPr>
-        <p:style>
-          <a:lnRef idx="2">
-            <a:schemeClr val="accent1"/>
-          </a:lnRef>
-          <a:fillRef idx="1">
-            <a:schemeClr val="lt1"/>
-          </a:fillRef>
-          <a:effectRef idx="0">
-            <a:schemeClr val="accent1"/>
-          </a:effectRef>
-          <a:fontRef idx="minor">
-            <a:schemeClr val="dk1"/>
-          </a:fontRef>
-        </p:style>
-        <p:txBody>
-          <a:bodyPr rot="0" spcFirstLastPara="0" vertOverflow="overflow" horzOverflow="overflow" vert="horz" wrap="square" lIns="91440" tIns="45720" rIns="91440" bIns="45720" numCol="1" spcCol="0" rtlCol="0" fromWordArt="0" anchor="ctr" anchorCtr="0" forceAA="0" compatLnSpc="1">
-            <a:prstTxWarp prst="textNoShape">
-              <a:avLst/>
-            </a:prstTxWarp>
-            <a:noAutofit/>
-          </a:bodyPr>
-          <a:lstStyle/>
-          <a:p>
-            <a:pPr algn="ctr"/>
-            <a:r>
-              <a:rPr lang="en-US" dirty="0">
-                <a:solidFill>
-                  <a:schemeClr val="tx1"/>
-                </a:solidFill>
-              </a:rPr>
-              <a:t>Talk more about acceptance testing.  Exercise: write a tester for quadratic-root (tester a b c x) should return true </a:t>
-            </a:r>
-            <a:r>
-              <a:rPr lang="en-US" dirty="0" err="1">
-                <a:solidFill>
-                  <a:schemeClr val="tx1"/>
-                </a:solidFill>
-              </a:rPr>
-              <a:t>iff</a:t>
-            </a:r>
-            <a:r>
-              <a:rPr lang="en-US" dirty="0">
-                <a:solidFill>
-                  <a:schemeClr val="tx1"/>
-                </a:solidFill>
-              </a:rPr>
-              <a:t> ax^2+bx+c = 0.</a:t>
-            </a:r>
           </a:p>
         </p:txBody>
       </p:sp>
@@ -12268,7 +11340,7 @@
       </p:grpSpPr>
       <p:sp>
         <p:nvSpPr>
-          <p:cNvPr id="2" name="Title 1"/>
+          <p:cNvPr id="4" name="Title 3"/>
           <p:cNvSpPr>
             <a:spLocks noGrp="1"/>
           </p:cNvSpPr>
@@ -12279,13 +11351,13 @@
         <p:spPr/>
         <p:txBody>
           <a:bodyPr>
-            <a:normAutofit fontScale="90000"/>
+            <a:normAutofit/>
           </a:bodyPr>
           <a:lstStyle/>
           <a:p>
             <a:r>
               <a:rPr lang="en-US" dirty="0"/>
-              <a:t>Another classification: Kinds of Testing</a:t>
+              <a:t>Mechanics of Testing</a:t>
             </a:r>
           </a:p>
         </p:txBody>
@@ -12303,71 +11375,147 @@
         <p:spPr/>
         <p:txBody>
           <a:bodyPr>
-            <a:normAutofit fontScale="92500" lnSpcReduction="20000"/>
+            <a:normAutofit fontScale="85000" lnSpcReduction="20000"/>
           </a:bodyPr>
           <a:lstStyle/>
           <a:p>
             <a:r>
-              <a:rPr lang="en-US" i="1" dirty="0">
-                <a:solidFill>
-                  <a:srgbClr val="FF0000"/>
-                </a:solidFill>
-              </a:rPr>
-              <a:t>Black-box testing</a:t>
-            </a:r>
-            <a:r>
-              <a:rPr lang="en-US" dirty="0"/>
-              <a:t>: Tests where we don’t know anything about the internals of the program</a:t>
-            </a:r>
-          </a:p>
-          <a:p>
-            <a:r>
-              <a:rPr lang="en-US" i="1" dirty="0">
-                <a:solidFill>
-                  <a:srgbClr val="FF0000"/>
-                </a:solidFill>
-              </a:rPr>
-              <a:t>White-box testing</a:t>
-            </a:r>
-            <a:r>
-              <a:rPr lang="en-US" dirty="0"/>
-              <a:t>: Tests where we take advantage of what we know about the program or the requirements</a:t>
+              <a:rPr lang="en-US" dirty="0"/>
+              <a:t>We will give you a file called </a:t>
+            </a:r>
+            <a:r>
+              <a:rPr lang="en-US" b="1" dirty="0" err="1">
+                <a:hlinkClick r:id="rId3" action="ppaction://hlinkfile"/>
+              </a:rPr>
+              <a:t>extras.rkt</a:t>
+            </a:r>
+            <a:r>
+              <a:rPr lang="en-US" dirty="0"/>
+              <a:t> that you should put in the folder with your work.</a:t>
+            </a:r>
+          </a:p>
+          <a:p>
+            <a:r>
+              <a:rPr lang="en-US" dirty="0"/>
+              <a:t>Near the top of your file, write</a:t>
+            </a:r>
+          </a:p>
+          <a:p>
+            <a:pPr marL="400050" lvl="1" indent="0">
+              <a:buNone/>
+            </a:pPr>
+            <a:r>
+              <a:rPr lang="en-US" sz="2400" b="1" dirty="0">
+                <a:latin typeface="Consolas" pitchFamily="49" charset="0"/>
+                <a:cs typeface="Consolas" pitchFamily="49" charset="0"/>
+              </a:rPr>
+              <a:t>(require </a:t>
+            </a:r>
+            <a:r>
+              <a:rPr lang="en-US" sz="2400" b="1" dirty="0" err="1">
+                <a:latin typeface="Consolas" pitchFamily="49" charset="0"/>
+                <a:cs typeface="Consolas" pitchFamily="49" charset="0"/>
+              </a:rPr>
+              <a:t>rackunit</a:t>
+            </a:r>
+            <a:r>
+              <a:rPr lang="en-US" sz="2400" b="1" dirty="0">
+                <a:latin typeface="Consolas" pitchFamily="49" charset="0"/>
+                <a:cs typeface="Consolas" pitchFamily="49" charset="0"/>
+              </a:rPr>
+              <a:t>) </a:t>
+            </a:r>
+          </a:p>
+          <a:p>
+            <a:pPr marL="400050" lvl="1" indent="0">
+              <a:buNone/>
+            </a:pPr>
+            <a:r>
+              <a:rPr lang="en-US" sz="2400" b="1" dirty="0">
+                <a:latin typeface="Consolas" pitchFamily="49" charset="0"/>
+                <a:cs typeface="Consolas" pitchFamily="49" charset="0"/>
+              </a:rPr>
+              <a:t>(require "</a:t>
+            </a:r>
+            <a:r>
+              <a:rPr lang="en-US" sz="2400" b="1" dirty="0" err="1">
+                <a:latin typeface="Consolas" pitchFamily="49" charset="0"/>
+                <a:cs typeface="Consolas" pitchFamily="49" charset="0"/>
+              </a:rPr>
+              <a:t>extras.rkt</a:t>
+            </a:r>
+            <a:r>
+              <a:rPr lang="en-US" sz="2400" b="1" dirty="0">
+                <a:latin typeface="Consolas" pitchFamily="49" charset="0"/>
+                <a:cs typeface="Consolas" pitchFamily="49" charset="0"/>
+              </a:rPr>
+              <a:t>")</a:t>
+            </a:r>
+          </a:p>
+          <a:p>
+            <a:pPr marL="0" indent="0">
+              <a:buNone/>
+            </a:pPr>
+            <a:r>
+              <a:rPr lang="en-US" dirty="0">
+                <a:cs typeface="Consolas" pitchFamily="49" charset="0"/>
+              </a:rPr>
+              <a:t>   to load our testing framework.</a:t>
+            </a:r>
+          </a:p>
+          <a:p>
+            <a:r>
+              <a:rPr lang="en-US" dirty="0"/>
+              <a:t>Tests live in the file with the code </a:t>
+            </a:r>
+          </a:p>
+          <a:p>
+            <a:r>
+              <a:rPr lang="en-US" dirty="0"/>
+              <a:t>That way they get run every time the code is loaded</a:t>
             </a:r>
           </a:p>
           <a:p>
             <a:pPr lvl="1"/>
             <a:r>
               <a:rPr lang="en-US" dirty="0"/>
-              <a:t>Example: our tests for f2c took advantage of the fact that f2c was a linear relationship: if the program worked for two values, we can be confident that it will work for others </a:t>
-            </a:r>
-          </a:p>
-          <a:p>
-            <a:pPr lvl="2"/>
-            <a:r>
-              <a:rPr lang="en-US" dirty="0"/>
-              <a:t>Except for overflow, etc. </a:t>
-            </a:r>
-            <a:r>
-              <a:rPr lang="en-US" dirty="0">
-                <a:sym typeface="Wingdings" pitchFamily="2" charset="2"/>
-              </a:rPr>
-              <a:t></a:t>
-            </a:r>
-          </a:p>
-          <a:p>
-            <a:r>
-              <a:rPr lang="en-US" dirty="0">
-                <a:sym typeface="Wingdings" pitchFamily="2" charset="2"/>
-              </a:rPr>
-              <a:t>We will do mostly white-box testing.</a:t>
-            </a:r>
-            <a:endParaRPr lang="en-US" dirty="0"/>
-          </a:p>
-        </p:txBody>
-      </p:sp>
-      <p:sp>
-        <p:nvSpPr>
-          <p:cNvPr id="4" name="Slide Number Placeholder 3"/>
+              <a:t>This accomplishes regression testing.</a:t>
+            </a:r>
+          </a:p>
+          <a:p>
+            <a:r>
+              <a:rPr lang="en-US" dirty="0"/>
+              <a:t>Wrap your tests in </a:t>
+            </a:r>
+            <a:r>
+              <a:rPr lang="en-US" sz="2800" b="1" dirty="0">
+                <a:latin typeface="Consolas" panose="020B0609020204030204" pitchFamily="49" charset="0"/>
+                <a:cs typeface="Consolas" panose="020B0609020204030204" pitchFamily="49" charset="0"/>
+              </a:rPr>
+              <a:t>(begin-for-test ....)</a:t>
+            </a:r>
+          </a:p>
+          <a:p>
+            <a:pPr lvl="1"/>
+            <a:r>
+              <a:rPr lang="en-US" dirty="0"/>
+              <a:t>that way you can put the tests anywhere in your file, and they will be run at the end of the file</a:t>
+            </a:r>
+          </a:p>
+          <a:p>
+            <a:pPr marL="0" indent="0">
+              <a:buNone/>
+            </a:pPr>
+            <a:endParaRPr lang="en-US" sz="2400" b="1" dirty="0">
+              <a:latin typeface="Consolas" pitchFamily="49" charset="0"/>
+              <a:cs typeface="Consolas" pitchFamily="49" charset="0"/>
+            </a:endParaRPr>
+          </a:p>
+        </p:txBody>
+      </p:sp>
+      <p:sp>
+        <p:nvSpPr>
+          <p:cNvPr id="2" name="Slide Number Placeholder 1"/>
           <p:cNvSpPr>
             <a:spLocks noGrp="1"/>
           </p:cNvSpPr>
@@ -12392,7 +11540,7 @@
     </p:spTree>
     <p:extLst>
       <p:ext uri="{BB962C8B-B14F-4D97-AF65-F5344CB8AC3E}">
-        <p14:creationId xmlns:p14="http://schemas.microsoft.com/office/powerpoint/2010/main" val="1880916034"/>
+        <p14:creationId xmlns:p14="http://schemas.microsoft.com/office/powerpoint/2010/main" val="3804961615"/>
       </p:ext>
     </p:extLst>
   </p:cSld>
@@ -12431,14 +11579,12 @@
         </p:nvSpPr>
         <p:spPr/>
         <p:txBody>
-          <a:bodyPr>
-            <a:normAutofit fontScale="90000"/>
-          </a:bodyPr>
-          <a:lstStyle/>
-          <a:p>
-            <a:r>
-              <a:rPr lang="en-US" dirty="0"/>
-              <a:t>Still another classification: unit testing vs. integration testing</a:t>
+          <a:bodyPr/>
+          <a:lstStyle/>
+          <a:p>
+            <a:r>
+              <a:rPr lang="en-US" dirty="0"/>
+              <a:t>The simplest test cases</a:t>
             </a:r>
           </a:p>
         </p:txBody>
@@ -12455,49 +11601,86 @@
         </p:nvSpPr>
         <p:spPr/>
         <p:txBody>
-          <a:bodyPr>
-            <a:normAutofit fontScale="92500"/>
-          </a:bodyPr>
-          <a:lstStyle/>
-          <a:p>
-            <a:r>
-              <a:rPr lang="en-US" i="1" dirty="0">
-                <a:solidFill>
-                  <a:srgbClr val="FF0000"/>
-                </a:solidFill>
-              </a:rPr>
-              <a:t>Unit testing </a:t>
-            </a:r>
-            <a:r>
-              <a:rPr lang="en-US" dirty="0"/>
-              <a:t>is about testing single functions or small groups of functions.</a:t>
-            </a:r>
-          </a:p>
-          <a:p>
-            <a:r>
-              <a:rPr lang="en-US" i="1" dirty="0">
-                <a:solidFill>
-                  <a:srgbClr val="FF0000"/>
-                </a:solidFill>
-              </a:rPr>
-              <a:t>Integration testing </a:t>
-            </a:r>
-            <a:r>
-              <a:rPr lang="en-US" dirty="0"/>
-              <a:t>is about checking to see that larger pieces of the system fit together.</a:t>
-            </a:r>
-          </a:p>
-          <a:p>
-            <a:r>
-              <a:rPr lang="en-US" dirty="0"/>
-              <a:t>We will do mostly unit testing.  For us, a unit is either a single function or a small group of functions.</a:t>
-            </a:r>
-          </a:p>
-          <a:p>
-            <a:r>
-              <a:rPr lang="en-US" dirty="0"/>
-              <a:t>It’s important to understand just what function(s) your test is testing.  More on this shortly.</a:t>
-            </a:r>
+          <a:bodyPr/>
+          <a:lstStyle/>
+          <a:p>
+            <a:r>
+              <a:rPr lang="en-US" dirty="0"/>
+              <a:t>Compute the right answer by hand, and make up test cases to match</a:t>
+            </a:r>
+          </a:p>
+          <a:p>
+            <a:endParaRPr lang="en-US" dirty="0"/>
+          </a:p>
+          <a:p>
+            <a:pPr>
+              <a:buNone/>
+            </a:pPr>
+            <a:r>
+              <a:rPr lang="en-US" sz="2000" b="1" dirty="0">
+                <a:latin typeface="Consolas" pitchFamily="49" charset="0"/>
+                <a:cs typeface="Consolas" pitchFamily="49" charset="0"/>
+              </a:rPr>
+              <a:t>(begin-for-test</a:t>
+            </a:r>
+          </a:p>
+          <a:p>
+            <a:pPr>
+              <a:buNone/>
+            </a:pPr>
+            <a:r>
+              <a:rPr lang="en-US" sz="2000" b="1" dirty="0">
+                <a:latin typeface="Consolas" pitchFamily="49" charset="0"/>
+                <a:cs typeface="Consolas" pitchFamily="49" charset="0"/>
+              </a:rPr>
+              <a:t>  (check-equal? (f2c 32) 0 </a:t>
+            </a:r>
+          </a:p>
+          <a:p>
+            <a:pPr>
+              <a:buNone/>
+            </a:pPr>
+            <a:r>
+              <a:rPr lang="en-US" sz="2000" b="1" dirty="0">
+                <a:latin typeface="Consolas" pitchFamily="49" charset="0"/>
+                <a:cs typeface="Consolas" pitchFamily="49" charset="0"/>
+              </a:rPr>
+              <a:t>    "32 Fahrenheit was not 0 Celsius")</a:t>
+            </a:r>
+          </a:p>
+          <a:p>
+            <a:pPr>
+              <a:buNone/>
+            </a:pPr>
+            <a:r>
+              <a:rPr lang="en-US" sz="2000" b="1" dirty="0">
+                <a:latin typeface="Consolas" pitchFamily="49" charset="0"/>
+                <a:cs typeface="Consolas" pitchFamily="49" charset="0"/>
+              </a:rPr>
+              <a:t>  (check-equal? (f2c 212) 100 </a:t>
+            </a:r>
+          </a:p>
+          <a:p>
+            <a:pPr>
+              <a:buNone/>
+            </a:pPr>
+            <a:r>
+              <a:rPr lang="en-US" sz="2000" b="1" dirty="0">
+                <a:latin typeface="Consolas" pitchFamily="49" charset="0"/>
+                <a:cs typeface="Consolas" pitchFamily="49" charset="0"/>
+              </a:rPr>
+              <a:t>    "212 Fahrenheit was not 100 Celsius"))</a:t>
+            </a:r>
+            <a:endParaRPr lang="en-US" sz="2000" b="1" dirty="0">
+              <a:latin typeface="Courier New" pitchFamily="49" charset="0"/>
+              <a:cs typeface="Courier New" pitchFamily="49" charset="0"/>
+            </a:endParaRPr>
+          </a:p>
+          <a:p>
+            <a:pPr marL="0" indent="0">
+              <a:buNone/>
+            </a:pPr>
+            <a:endParaRPr lang="en-US" dirty="0"/>
           </a:p>
         </p:txBody>
       </p:sp>
@@ -12540,7 +11723,7 @@
     </p:spTree>
     <p:extLst>
       <p:ext uri="{BB962C8B-B14F-4D97-AF65-F5344CB8AC3E}">
-        <p14:creationId xmlns:p14="http://schemas.microsoft.com/office/powerpoint/2010/main" val="1758965103"/>
+        <p14:creationId xmlns:p14="http://schemas.microsoft.com/office/powerpoint/2010/main" val="4207347293"/>
       </p:ext>
     </p:extLst>
   </p:cSld>
@@ -12584,7 +11767,7 @@
           <a:p>
             <a:r>
               <a:rPr lang="en-US" dirty="0"/>
-              <a:t>Test Coverage</a:t>
+              <a:t>This may not be enough</a:t>
             </a:r>
           </a:p>
         </p:txBody>
@@ -12602,101 +11785,77 @@
         <p:spPr/>
         <p:txBody>
           <a:bodyPr>
-            <a:normAutofit lnSpcReduction="10000"/>
+            <a:normAutofit/>
           </a:bodyPr>
           <a:lstStyle/>
           <a:p>
             <a:r>
               <a:rPr lang="en-US" dirty="0"/>
-              <a:t>How much of the possible behaviors have we tested?</a:t>
-            </a:r>
-          </a:p>
-          <a:p>
-            <a:r>
-              <a:rPr lang="en-US" dirty="0"/>
-              <a:t>Want every line in the program exercised.  This is called </a:t>
-            </a:r>
-            <a:r>
-              <a:rPr lang="en-US" i="1" dirty="0">
+              <a:t>Did I do the hand-computation right?</a:t>
+            </a:r>
+          </a:p>
+          <a:p>
+            <a:pPr lvl="1"/>
+            <a:r>
+              <a:rPr lang="en-US" dirty="0"/>
+              <a:t>If you’re lucky, the problem set said what the answer should be.</a:t>
+            </a:r>
+          </a:p>
+          <a:p>
+            <a:pPr lvl="1"/>
+            <a:r>
+              <a:rPr lang="en-US" dirty="0"/>
+              <a:t>Otherwise, how does the reader know I didn’t just take the result of my function and paste it into the test?</a:t>
+            </a:r>
+          </a:p>
+          <a:p>
+            <a:r>
+              <a:rPr lang="en-US" dirty="0"/>
+              <a:t>Maybe there’s more than one correct answer!</a:t>
+            </a:r>
+          </a:p>
+        </p:txBody>
+      </p:sp>
+      <p:sp>
+        <p:nvSpPr>
+          <p:cNvPr id="4" name="Slide Number Placeholder 3"/>
+          <p:cNvSpPr>
+            <a:spLocks noGrp="1"/>
+          </p:cNvSpPr>
+          <p:nvPr>
+            <p:ph type="sldNum" sz="quarter" idx="12"/>
+          </p:nvPr>
+        </p:nvSpPr>
+        <p:spPr/>
+        <p:txBody>
+          <a:bodyPr/>
+          <a:lstStyle/>
+          <a:p>
+            <a:fld id="{2AF3B5EA-18B6-4040-9F78-6052AF49C681}" type="slidenum">
+              <a:rPr lang="en-US" smtClean="0">
                 <a:solidFill>
-                  <a:srgbClr val="FF0000"/>
+                  <a:prstClr val="black">
+                    <a:tint val="75000"/>
+                  </a:prstClr>
                 </a:solidFill>
               </a:rPr>
-              <a:t>100% expression coverage</a:t>
-            </a:r>
-            <a:r>
-              <a:rPr lang="en-US" dirty="0"/>
-              <a:t>.</a:t>
-            </a:r>
-          </a:p>
-          <a:p>
-            <a:r>
-              <a:rPr lang="en-US" dirty="0"/>
-              <a:t>This is our </a:t>
-            </a:r>
-            <a:r>
-              <a:rPr lang="en-US" b="1" dirty="0"/>
-              <a:t>minimum</a:t>
-            </a:r>
-            <a:r>
-              <a:rPr lang="en-US" dirty="0"/>
-              <a:t> testing requirement.</a:t>
-            </a:r>
-          </a:p>
-          <a:p>
-            <a:r>
-              <a:rPr lang="en-US" dirty="0"/>
-              <a:t>But this doesn’t necessarily test all the desired behaviors of our program.</a:t>
-            </a:r>
-          </a:p>
-          <a:p>
-            <a:r>
-              <a:rPr lang="en-US" dirty="0"/>
-              <a:t>To get a better handle on this, we introduce the idea of </a:t>
-            </a:r>
-            <a:r>
-              <a:rPr lang="en-US" i="1" dirty="0">
-                <a:solidFill>
-                  <a:srgbClr val="FF0000"/>
-                </a:solidFill>
-              </a:rPr>
-              <a:t>equivalence partitioning</a:t>
-            </a:r>
-            <a:r>
-              <a:rPr lang="en-US" dirty="0"/>
-              <a:t>.</a:t>
-            </a:r>
-          </a:p>
-        </p:txBody>
-      </p:sp>
-      <p:sp>
-        <p:nvSpPr>
-          <p:cNvPr id="4" name="Slide Number Placeholder 3"/>
-          <p:cNvSpPr>
-            <a:spLocks noGrp="1"/>
-          </p:cNvSpPr>
-          <p:nvPr>
-            <p:ph type="sldNum" sz="quarter" idx="12"/>
-          </p:nvPr>
-        </p:nvSpPr>
-        <p:spPr/>
-        <p:txBody>
-          <a:bodyPr/>
-          <a:lstStyle/>
-          <a:p>
-            <a:fld id="{B6F15528-21DE-4FAA-801E-634DDDAF4B2B}" type="slidenum">
-              <a:rPr lang="en-US" smtClean="0"/>
               <a:pPr/>
               <a:t>9</a:t>
             </a:fld>
-            <a:endParaRPr lang="en-US"/>
+            <a:endParaRPr lang="en-US">
+              <a:solidFill>
+                <a:prstClr val="black">
+                  <a:tint val="75000"/>
+                </a:prstClr>
+              </a:solidFill>
+            </a:endParaRPr>
           </a:p>
         </p:txBody>
       </p:sp>
     </p:spTree>
     <p:extLst>
       <p:ext uri="{BB962C8B-B14F-4D97-AF65-F5344CB8AC3E}">
-        <p14:creationId xmlns:p14="http://schemas.microsoft.com/office/powerpoint/2010/main" val="2299138388"/>
+        <p14:creationId xmlns:p14="http://schemas.microsoft.com/office/powerpoint/2010/main" val="4233369243"/>
       </p:ext>
     </p:extLst>
   </p:cSld>

</xml_diff>